<commit_message>
Got through three pillars
</commit_message>
<xml_diff>
--- a/Slides/Lesson1.4.pptx
+++ b/Slides/Lesson1.4.pptx
@@ -5,7 +5,7 @@
     <p:sldMasterId id="2147483648" r:id="rId1"/>
   </p:sldMasterIdLst>
   <p:notesMasterIdLst>
-    <p:notesMasterId r:id="rId9"/>
+    <p:notesMasterId r:id="rId13"/>
   </p:notesMasterIdLst>
   <p:sldIdLst>
     <p:sldId id="256" r:id="rId2"/>
@@ -15,6 +15,10 @@
     <p:sldId id="260" r:id="rId6"/>
     <p:sldId id="261" r:id="rId7"/>
     <p:sldId id="262" r:id="rId8"/>
+    <p:sldId id="263" r:id="rId9"/>
+    <p:sldId id="264" r:id="rId10"/>
+    <p:sldId id="266" r:id="rId11"/>
+    <p:sldId id="267" r:id="rId12"/>
   </p:sldIdLst>
   <p:sldSz cx="12192000" cy="6858000"/>
   <p:notesSz cx="6858000" cy="9144000"/>
@@ -2665,7 +2669,7 @@
           <a:p>
             <a:fld id="{E5E8C84B-D8A8-47B3-B318-2DA646335F2F}" type="datetimeFigureOut">
               <a:rPr lang="en-US" smtClean="0"/>
-              <a:t>4/16/2019</a:t>
+              <a:t>4/17/2019</a:t>
             </a:fld>
             <a:endParaRPr lang="en-US"/>
           </a:p>
@@ -3190,6 +3194,93 @@
 </p:notes>
 </file>
 
+<file path=ppt/notesSlides/notesSlide4.xml><?xml version="1.0" encoding="utf-8"?>
+<p:notes xmlns:a="http://schemas.openxmlformats.org/drawingml/2006/main" xmlns:r="http://schemas.openxmlformats.org/officeDocument/2006/relationships" xmlns:p="http://schemas.openxmlformats.org/presentationml/2006/main">
+  <p:cSld>
+    <p:spTree>
+      <p:nvGrpSpPr>
+        <p:cNvPr id="1" name=""/>
+        <p:cNvGrpSpPr/>
+        <p:nvPr/>
+      </p:nvGrpSpPr>
+      <p:grpSpPr>
+        <a:xfrm>
+          <a:off x="0" y="0"/>
+          <a:ext cx="0" cy="0"/>
+          <a:chOff x="0" y="0"/>
+          <a:chExt cx="0" cy="0"/>
+        </a:xfrm>
+      </p:grpSpPr>
+      <p:sp>
+        <p:nvSpPr>
+          <p:cNvPr id="2" name="Slide Image Placeholder 1"/>
+          <p:cNvSpPr>
+            <a:spLocks noGrp="1" noRot="1" noChangeAspect="1"/>
+          </p:cNvSpPr>
+          <p:nvPr>
+            <p:ph type="sldImg"/>
+          </p:nvPr>
+        </p:nvSpPr>
+        <p:spPr/>
+      </p:sp>
+      <p:sp>
+        <p:nvSpPr>
+          <p:cNvPr id="3" name="Notes Placeholder 2"/>
+          <p:cNvSpPr>
+            <a:spLocks noGrp="1"/>
+          </p:cNvSpPr>
+          <p:nvPr>
+            <p:ph type="body" idx="1"/>
+          </p:nvPr>
+        </p:nvSpPr>
+        <p:spPr/>
+        <p:txBody>
+          <a:bodyPr/>
+          <a:lstStyle/>
+          <a:p>
+            <a:r>
+              <a:rPr lang="en-US" dirty="0"/>
+              <a:t>Do example 3, and we are not done!</a:t>
+            </a:r>
+          </a:p>
+        </p:txBody>
+      </p:sp>
+      <p:sp>
+        <p:nvSpPr>
+          <p:cNvPr id="4" name="Slide Number Placeholder 3"/>
+          <p:cNvSpPr>
+            <a:spLocks noGrp="1"/>
+          </p:cNvSpPr>
+          <p:nvPr>
+            <p:ph type="sldNum" sz="quarter" idx="5"/>
+          </p:nvPr>
+        </p:nvSpPr>
+        <p:spPr/>
+        <p:txBody>
+          <a:bodyPr/>
+          <a:lstStyle/>
+          <a:p>
+            <a:fld id="{4C397B2A-FCB2-4CFC-8D19-A7AE88AABFF9}" type="slidenum">
+              <a:rPr lang="en-US" smtClean="0"/>
+              <a:t>11</a:t>
+            </a:fld>
+            <a:endParaRPr lang="en-US"/>
+          </a:p>
+        </p:txBody>
+      </p:sp>
+    </p:spTree>
+    <p:extLst>
+      <p:ext uri="{BB962C8B-B14F-4D97-AF65-F5344CB8AC3E}">
+        <p14:creationId xmlns:p14="http://schemas.microsoft.com/office/powerpoint/2010/main" val="4160293506"/>
+      </p:ext>
+    </p:extLst>
+  </p:cSld>
+  <p:clrMapOvr>
+    <a:masterClrMapping/>
+  </p:clrMapOvr>
+</p:notes>
+</file>
+
 <file path=ppt/slideLayouts/slideLayout1.xml><?xml version="1.0" encoding="utf-8"?>
 <p:sldLayout xmlns:a="http://schemas.openxmlformats.org/drawingml/2006/main" xmlns:r="http://schemas.openxmlformats.org/officeDocument/2006/relationships" xmlns:p="http://schemas.openxmlformats.org/presentationml/2006/main" showMasterSp="0" type="title" preserve="1">
   <p:cSld name="Title Slide">
@@ -3936,7 +4027,7 @@
             <a:fld id="{B61BEF0D-F0BB-DE4B-95CE-6DB70DBA9567}" type="datetimeFigureOut">
               <a:rPr lang="en-US" dirty="0"/>
               <a:pPr/>
-              <a:t>4/16/2019</a:t>
+              <a:t>4/17/2019</a:t>
             </a:fld>
             <a:endParaRPr lang="en-US" dirty="0"/>
           </a:p>
@@ -4184,7 +4275,7 @@
             <a:fld id="{B61BEF0D-F0BB-DE4B-95CE-6DB70DBA9567}" type="datetimeFigureOut">
               <a:rPr lang="en-US" dirty="0"/>
               <a:pPr/>
-              <a:t>4/16/2019</a:t>
+              <a:t>4/17/2019</a:t>
             </a:fld>
             <a:endParaRPr lang="en-US" dirty="0"/>
           </a:p>
@@ -4495,7 +4586,7 @@
             <a:fld id="{B61BEF0D-F0BB-DE4B-95CE-6DB70DBA9567}" type="datetimeFigureOut">
               <a:rPr lang="en-US" dirty="0"/>
               <a:pPr/>
-              <a:t>4/16/2019</a:t>
+              <a:t>4/17/2019</a:t>
             </a:fld>
             <a:endParaRPr lang="en-US" dirty="0"/>
           </a:p>
@@ -4825,7 +4916,7 @@
             <a:fld id="{B61BEF0D-F0BB-DE4B-95CE-6DB70DBA9567}" type="datetimeFigureOut">
               <a:rPr lang="en-US" dirty="0"/>
               <a:pPr/>
-              <a:t>4/16/2019</a:t>
+              <a:t>4/17/2019</a:t>
             </a:fld>
             <a:endParaRPr lang="en-US" dirty="0"/>
           </a:p>
@@ -5136,7 +5227,7 @@
             <a:fld id="{B61BEF0D-F0BB-DE4B-95CE-6DB70DBA9567}" type="datetimeFigureOut">
               <a:rPr lang="en-US" dirty="0"/>
               <a:pPr/>
-              <a:t>4/16/2019</a:t>
+              <a:t>4/17/2019</a:t>
             </a:fld>
             <a:endParaRPr lang="en-US" dirty="0"/>
           </a:p>
@@ -5526,7 +5617,7 @@
             <a:fld id="{B61BEF0D-F0BB-DE4B-95CE-6DB70DBA9567}" type="datetimeFigureOut">
               <a:rPr lang="en-US" dirty="0"/>
               <a:pPr/>
-              <a:t>4/16/2019</a:t>
+              <a:t>4/17/2019</a:t>
             </a:fld>
             <a:endParaRPr lang="en-US" dirty="0"/>
           </a:p>
@@ -5692,7 +5783,7 @@
           <a:p>
             <a:fld id="{55C6B4A9-1611-4792-9094-5F34BCA07E0B}" type="datetimeFigureOut">
               <a:rPr lang="en-US" dirty="0"/>
-              <a:t>4/16/2019</a:t>
+              <a:t>4/17/2019</a:t>
             </a:fld>
             <a:endParaRPr lang="en-US" dirty="0"/>
           </a:p>
@@ -5868,7 +5959,7 @@
             <a:fld id="{B61BEF0D-F0BB-DE4B-95CE-6DB70DBA9567}" type="datetimeFigureOut">
               <a:rPr lang="en-US" dirty="0"/>
               <a:pPr/>
-              <a:t>4/16/2019</a:t>
+              <a:t>4/17/2019</a:t>
             </a:fld>
             <a:endParaRPr lang="en-US" dirty="0"/>
           </a:p>
@@ -6034,7 +6125,7 @@
           <a:p>
             <a:fld id="{42A54C80-263E-416B-A8E0-580EDEADCBDC}" type="datetimeFigureOut">
               <a:rPr lang="en-US" dirty="0"/>
-              <a:t>4/16/2019</a:t>
+              <a:t>4/17/2019</a:t>
             </a:fld>
             <a:endParaRPr lang="en-US" dirty="0"/>
           </a:p>
@@ -6277,7 +6368,7 @@
             <a:fld id="{B61BEF0D-F0BB-DE4B-95CE-6DB70DBA9567}" type="datetimeFigureOut">
               <a:rPr lang="en-US" dirty="0"/>
               <a:pPr/>
-              <a:t>4/16/2019</a:t>
+              <a:t>4/17/2019</a:t>
             </a:fld>
             <a:endParaRPr lang="en-US" dirty="0"/>
           </a:p>
@@ -6505,7 +6596,7 @@
           <a:p>
             <a:fld id="{42A54C80-263E-416B-A8E0-580EDEADCBDC}" type="datetimeFigureOut">
               <a:rPr lang="en-US" dirty="0"/>
-              <a:t>4/16/2019</a:t>
+              <a:t>4/17/2019</a:t>
             </a:fld>
             <a:endParaRPr lang="en-US" dirty="0"/>
           </a:p>
@@ -6875,7 +6966,7 @@
             <a:fld id="{B61BEF0D-F0BB-DE4B-95CE-6DB70DBA9567}" type="datetimeFigureOut">
               <a:rPr lang="en-US" dirty="0"/>
               <a:pPr/>
-              <a:t>4/16/2019</a:t>
+              <a:t>4/17/2019</a:t>
             </a:fld>
             <a:endParaRPr lang="en-US" dirty="0"/>
           </a:p>
@@ -6995,7 +7086,7 @@
             <a:fld id="{B61BEF0D-F0BB-DE4B-95CE-6DB70DBA9567}" type="datetimeFigureOut">
               <a:rPr lang="en-US" dirty="0"/>
               <a:pPr/>
-              <a:t>4/16/2019</a:t>
+              <a:t>4/17/2019</a:t>
             </a:fld>
             <a:endParaRPr lang="en-US" dirty="0"/>
           </a:p>
@@ -7087,7 +7178,7 @@
             <a:fld id="{B61BEF0D-F0BB-DE4B-95CE-6DB70DBA9567}" type="datetimeFigureOut">
               <a:rPr lang="en-US" dirty="0"/>
               <a:pPr/>
-              <a:t>4/16/2019</a:t>
+              <a:t>4/17/2019</a:t>
             </a:fld>
             <a:endParaRPr lang="en-US" dirty="0"/>
           </a:p>
@@ -7338,7 +7429,7 @@
           <a:p>
             <a:fld id="{42A54C80-263E-416B-A8E0-580EDEADCBDC}" type="datetimeFigureOut">
               <a:rPr lang="en-US" dirty="0"/>
-              <a:t>4/16/2019</a:t>
+              <a:t>4/17/2019</a:t>
             </a:fld>
             <a:endParaRPr lang="en-US" dirty="0"/>
           </a:p>
@@ -7640,7 +7731,7 @@
             <a:fld id="{B61BEF0D-F0BB-DE4B-95CE-6DB70DBA9567}" type="datetimeFigureOut">
               <a:rPr lang="en-US" dirty="0"/>
               <a:pPr/>
-              <a:t>4/16/2019</a:t>
+              <a:t>4/17/2019</a:t>
             </a:fld>
             <a:endParaRPr lang="en-US" dirty="0"/>
           </a:p>
@@ -8338,7 +8429,7 @@
             <a:fld id="{B61BEF0D-F0BB-DE4B-95CE-6DB70DBA9567}" type="datetimeFigureOut">
               <a:rPr lang="en-US" dirty="0"/>
               <a:pPr/>
-              <a:t>4/16/2019</a:t>
+              <a:t>4/17/2019</a:t>
             </a:fld>
             <a:endParaRPr lang="en-US" dirty="0"/>
           </a:p>
@@ -8927,6 +9018,373 @@
 </p:sld>
 </file>
 
+<file path=ppt/slides/slide10.xml><?xml version="1.0" encoding="utf-8"?>
+<p:sld xmlns:a="http://schemas.openxmlformats.org/drawingml/2006/main" xmlns:r="http://schemas.openxmlformats.org/officeDocument/2006/relationships" xmlns:p="http://schemas.openxmlformats.org/presentationml/2006/main">
+  <p:cSld>
+    <p:spTree>
+      <p:nvGrpSpPr>
+        <p:cNvPr id="1" name=""/>
+        <p:cNvGrpSpPr/>
+        <p:nvPr/>
+      </p:nvGrpSpPr>
+      <p:grpSpPr>
+        <a:xfrm>
+          <a:off x="0" y="0"/>
+          <a:ext cx="0" cy="0"/>
+          <a:chOff x="0" y="0"/>
+          <a:chExt cx="0" cy="0"/>
+        </a:xfrm>
+      </p:grpSpPr>
+      <p:sp>
+        <p:nvSpPr>
+          <p:cNvPr id="2" name="Title 1">
+            <a:extLst>
+              <a:ext uri="{FF2B5EF4-FFF2-40B4-BE49-F238E27FC236}">
+                <a16:creationId xmlns:a16="http://schemas.microsoft.com/office/drawing/2014/main" id="{E37FE3EC-290D-4F93-B340-99EE4A7BF0D5}"/>
+              </a:ext>
+            </a:extLst>
+          </p:cNvPr>
+          <p:cNvSpPr>
+            <a:spLocks noGrp="1"/>
+          </p:cNvSpPr>
+          <p:nvPr>
+            <p:ph type="title"/>
+          </p:nvPr>
+        </p:nvSpPr>
+        <p:spPr/>
+        <p:txBody>
+          <a:bodyPr/>
+          <a:lstStyle/>
+          <a:p>
+            <a:r>
+              <a:rPr lang="en-US" dirty="0"/>
+              <a:t>Polymorphism</a:t>
+            </a:r>
+          </a:p>
+        </p:txBody>
+      </p:sp>
+      <p:sp>
+        <p:nvSpPr>
+          <p:cNvPr id="3" name="Content Placeholder 2">
+            <a:extLst>
+              <a:ext uri="{FF2B5EF4-FFF2-40B4-BE49-F238E27FC236}">
+                <a16:creationId xmlns:a16="http://schemas.microsoft.com/office/drawing/2014/main" id="{69AA75B4-BAA5-454C-B927-74B69AFEFA9F}"/>
+              </a:ext>
+            </a:extLst>
+          </p:cNvPr>
+          <p:cNvSpPr>
+            <a:spLocks noGrp="1"/>
+          </p:cNvSpPr>
+          <p:nvPr>
+            <p:ph idx="1"/>
+          </p:nvPr>
+        </p:nvSpPr>
+        <p:spPr/>
+        <p:txBody>
+          <a:bodyPr>
+            <a:normAutofit lnSpcReduction="10000"/>
+          </a:bodyPr>
+          <a:lstStyle/>
+          <a:p>
+            <a:r>
+              <a:rPr lang="en-US" dirty="0"/>
+              <a:t>The word </a:t>
+            </a:r>
+            <a:r>
+              <a:rPr lang="en-US" b="1" u="sng" dirty="0"/>
+              <a:t>Polymorphism</a:t>
+            </a:r>
+            <a:r>
+              <a:rPr lang="en-US" dirty="0"/>
+              <a:t> has Greek roots that roughly mean “many forms”</a:t>
+            </a:r>
+          </a:p>
+          <a:p>
+            <a:r>
+              <a:rPr lang="en-US" dirty="0"/>
+              <a:t>In Java, this means that an object of one type can take a form of an object of another type.</a:t>
+            </a:r>
+          </a:p>
+          <a:p>
+            <a:r>
+              <a:rPr lang="en-US" dirty="0"/>
+              <a:t>But wait! There’s rules to this.</a:t>
+            </a:r>
+          </a:p>
+          <a:p>
+            <a:r>
+              <a:rPr lang="en-US" dirty="0"/>
+              <a:t>This only works when there is an </a:t>
+            </a:r>
+            <a:r>
+              <a:rPr lang="en-US" i="1" dirty="0"/>
+              <a:t>is-a</a:t>
+            </a:r>
+            <a:r>
+              <a:rPr lang="en-US" dirty="0"/>
+              <a:t> relationship at play, meaning Polymorphism and Inheritance work hand in hand. </a:t>
+            </a:r>
+          </a:p>
+          <a:p>
+            <a:r>
+              <a:rPr lang="en-US" dirty="0"/>
+              <a:t>Basically, this means that a variable of the type of a super class can reference an instance of a subclass.</a:t>
+            </a:r>
+          </a:p>
+          <a:p>
+            <a:r>
+              <a:rPr lang="en-US" dirty="0"/>
+              <a:t>Also, when we override a method, we are making it </a:t>
+            </a:r>
+            <a:r>
+              <a:rPr lang="en-US" b="1" u="sng" dirty="0"/>
+              <a:t>polymorphic</a:t>
+            </a:r>
+            <a:r>
+              <a:rPr lang="en-US" dirty="0"/>
+              <a:t>, and when calling that method, the compiler will search bottom-up for an implementation of that method, so the subclass’s implementation will always be used.</a:t>
+            </a:r>
+          </a:p>
+        </p:txBody>
+      </p:sp>
+    </p:spTree>
+    <p:extLst>
+      <p:ext uri="{BB962C8B-B14F-4D97-AF65-F5344CB8AC3E}">
+        <p14:creationId xmlns:p14="http://schemas.microsoft.com/office/powerpoint/2010/main" val="852952256"/>
+      </p:ext>
+    </p:extLst>
+  </p:cSld>
+  <p:clrMapOvr>
+    <a:masterClrMapping/>
+  </p:clrMapOvr>
+</p:sld>
+</file>
+
+<file path=ppt/slides/slide11.xml><?xml version="1.0" encoding="utf-8"?>
+<p:sld xmlns:a="http://schemas.openxmlformats.org/drawingml/2006/main" xmlns:r="http://schemas.openxmlformats.org/officeDocument/2006/relationships" xmlns:p="http://schemas.openxmlformats.org/presentationml/2006/main">
+  <p:cSld>
+    <p:bg>
+      <p:bgPr>
+        <a:solidFill>
+          <a:schemeClr val="bg1"/>
+        </a:solidFill>
+        <a:effectLst/>
+      </p:bgPr>
+    </p:bg>
+    <p:spTree>
+      <p:nvGrpSpPr>
+        <p:cNvPr id="1" name=""/>
+        <p:cNvGrpSpPr/>
+        <p:nvPr/>
+      </p:nvGrpSpPr>
+      <p:grpSpPr>
+        <a:xfrm>
+          <a:off x="0" y="0"/>
+          <a:ext cx="0" cy="0"/>
+          <a:chOff x="0" y="0"/>
+          <a:chExt cx="0" cy="0"/>
+        </a:xfrm>
+      </p:grpSpPr>
+      <p:sp>
+        <p:nvSpPr>
+          <p:cNvPr id="2" name="Title 1">
+            <a:extLst>
+              <a:ext uri="{FF2B5EF4-FFF2-40B4-BE49-F238E27FC236}">
+                <a16:creationId xmlns:a16="http://schemas.microsoft.com/office/drawing/2014/main" id="{ECD92E5B-D663-4A99-959A-8CD28A367E70}"/>
+              </a:ext>
+            </a:extLst>
+          </p:cNvPr>
+          <p:cNvSpPr>
+            <a:spLocks noGrp="1"/>
+          </p:cNvSpPr>
+          <p:nvPr>
+            <p:ph type="title"/>
+          </p:nvPr>
+        </p:nvSpPr>
+        <p:spPr>
+          <a:xfrm>
+            <a:off x="677334" y="609600"/>
+            <a:ext cx="8596668" cy="1320800"/>
+          </a:xfrm>
+        </p:spPr>
+        <p:txBody>
+          <a:bodyPr anchor="t">
+            <a:normAutofit/>
+          </a:bodyPr>
+          <a:lstStyle/>
+          <a:p>
+            <a:r>
+              <a:rPr lang="en-US"/>
+              <a:t>More on Polymorphic Methods</a:t>
+            </a:r>
+            <a:endParaRPr lang="en-US" dirty="0"/>
+          </a:p>
+        </p:txBody>
+      </p:sp>
+      <p:sp>
+        <p:nvSpPr>
+          <p:cNvPr id="3" name="Content Placeholder 2">
+            <a:extLst>
+              <a:ext uri="{FF2B5EF4-FFF2-40B4-BE49-F238E27FC236}">
+                <a16:creationId xmlns:a16="http://schemas.microsoft.com/office/drawing/2014/main" id="{C674A975-BC79-4F52-8699-6C6F38C15CB2}"/>
+              </a:ext>
+            </a:extLst>
+          </p:cNvPr>
+          <p:cNvSpPr>
+            <a:spLocks noGrp="1"/>
+          </p:cNvSpPr>
+          <p:nvPr>
+            <p:ph idx="1"/>
+          </p:nvPr>
+        </p:nvSpPr>
+        <p:spPr>
+          <a:xfrm>
+            <a:off x="677334" y="2160590"/>
+            <a:ext cx="5220430" cy="3701270"/>
+          </a:xfrm>
+        </p:spPr>
+        <p:txBody>
+          <a:bodyPr>
+            <a:normAutofit/>
+          </a:bodyPr>
+          <a:lstStyle/>
+          <a:p>
+            <a:pPr>
+              <a:lnSpc>
+                <a:spcPct val="90000"/>
+              </a:lnSpc>
+            </a:pPr>
+            <a:r>
+              <a:rPr lang="en-US" sz="1500" dirty="0"/>
+              <a:t>For instance, take a look at the UML for example 2.</a:t>
+            </a:r>
+          </a:p>
+          <a:p>
+            <a:pPr>
+              <a:lnSpc>
+                <a:spcPct val="90000"/>
+              </a:lnSpc>
+            </a:pPr>
+            <a:r>
+              <a:rPr lang="en-US" sz="1500" dirty="0"/>
+              <a:t>If I had a </a:t>
+            </a:r>
+            <a:r>
+              <a:rPr lang="en-US" sz="1500" dirty="0" err="1"/>
+              <a:t>BankAccount</a:t>
+            </a:r>
+            <a:r>
+              <a:rPr lang="en-US" sz="1500" dirty="0"/>
+              <a:t> object and call withdraw, the compiler will use the withdraw method as defined in the </a:t>
+            </a:r>
+            <a:r>
+              <a:rPr lang="en-US" sz="1500" dirty="0" err="1"/>
+              <a:t>BankAccount</a:t>
+            </a:r>
+            <a:r>
+              <a:rPr lang="en-US" sz="1500" dirty="0"/>
+              <a:t> class.</a:t>
+            </a:r>
+          </a:p>
+          <a:p>
+            <a:pPr>
+              <a:lnSpc>
+                <a:spcPct val="90000"/>
+              </a:lnSpc>
+            </a:pPr>
+            <a:r>
+              <a:rPr lang="en-US" sz="1500" dirty="0"/>
+              <a:t>However, if I call withdraw on a </a:t>
+            </a:r>
+            <a:r>
+              <a:rPr lang="en-US" sz="1500" dirty="0" err="1"/>
+              <a:t>SavingsAccount</a:t>
+            </a:r>
+            <a:r>
+              <a:rPr lang="en-US" sz="1500" dirty="0"/>
+              <a:t> object, the compiler will see that there is no such definition in the </a:t>
+            </a:r>
+            <a:r>
+              <a:rPr lang="en-US" sz="1500" dirty="0" err="1"/>
+              <a:t>SavingsAccount</a:t>
+            </a:r>
+            <a:r>
+              <a:rPr lang="en-US" sz="1500" dirty="0"/>
+              <a:t> class, so it will go up to the superclass and use the definition there. In the case of a deeply nested hierarchy, it will keep searching upwards until a definition is found.</a:t>
+            </a:r>
+          </a:p>
+          <a:p>
+            <a:pPr>
+              <a:lnSpc>
+                <a:spcPct val="90000"/>
+              </a:lnSpc>
+            </a:pPr>
+            <a:r>
+              <a:rPr lang="en-US" sz="1500" dirty="0"/>
+              <a:t>Now, if I call withdraw on a </a:t>
+            </a:r>
+            <a:r>
+              <a:rPr lang="en-US" sz="1500" dirty="0" err="1"/>
+              <a:t>CheckingAccount</a:t>
+            </a:r>
+            <a:r>
+              <a:rPr lang="en-US" sz="1500" dirty="0"/>
+              <a:t> object, the compiler will see the definition of withdraw in the </a:t>
+            </a:r>
+            <a:r>
+              <a:rPr lang="en-US" sz="1500" dirty="0" err="1"/>
+              <a:t>CheckingAccount</a:t>
+            </a:r>
+            <a:r>
+              <a:rPr lang="en-US" sz="1500" dirty="0"/>
+              <a:t> class, and use that method.</a:t>
+            </a:r>
+          </a:p>
+        </p:txBody>
+      </p:sp>
+      <p:pic>
+        <p:nvPicPr>
+          <p:cNvPr id="5" name="Picture 4" descr="A screenshot of a cell phone&#10;&#10;Description automatically generated">
+            <a:extLst>
+              <a:ext uri="{FF2B5EF4-FFF2-40B4-BE49-F238E27FC236}">
+                <a16:creationId xmlns:a16="http://schemas.microsoft.com/office/drawing/2014/main" id="{4939C132-98CC-468C-A1F2-67977150B49D}"/>
+              </a:ext>
+            </a:extLst>
+          </p:cNvPr>
+          <p:cNvPicPr>
+            <a:picLocks noChangeAspect="1"/>
+          </p:cNvPicPr>
+          <p:nvPr/>
+        </p:nvPicPr>
+        <p:blipFill>
+          <a:blip r:embed="rId3"/>
+          <a:stretch>
+            <a:fillRect/>
+          </a:stretch>
+        </p:blipFill>
+        <p:spPr>
+          <a:xfrm>
+            <a:off x="6096000" y="1930400"/>
+            <a:ext cx="4086394" cy="3841547"/>
+          </a:xfrm>
+          <a:prstGeom prst="rect">
+            <a:avLst/>
+          </a:prstGeom>
+        </p:spPr>
+      </p:pic>
+    </p:spTree>
+    <p:extLst>
+      <p:ext uri="{BB962C8B-B14F-4D97-AF65-F5344CB8AC3E}">
+        <p14:creationId xmlns:p14="http://schemas.microsoft.com/office/powerpoint/2010/main" val="139010937"/>
+      </p:ext>
+    </p:extLst>
+  </p:cSld>
+  <p:clrMapOvr>
+    <a:masterClrMapping/>
+  </p:clrMapOvr>
+</p:sld>
+</file>
+
 <file path=ppt/slides/slide2.xml><?xml version="1.0" encoding="utf-8"?>
 <p:sld xmlns:a="http://schemas.openxmlformats.org/drawingml/2006/main" xmlns:r="http://schemas.openxmlformats.org/officeDocument/2006/relationships" xmlns:p="http://schemas.openxmlformats.org/presentationml/2006/main">
   <p:cSld>
@@ -10294,12 +10752,12 @@
         </p:nvSpPr>
         <p:spPr>
           <a:xfrm>
-            <a:off x="677334" y="609600"/>
-            <a:ext cx="8596668" cy="1320800"/>
+            <a:off x="676746" y="609600"/>
+            <a:ext cx="3729076" cy="1320800"/>
           </a:xfrm>
         </p:spPr>
         <p:txBody>
-          <a:bodyPr anchor="t">
+          <a:bodyPr anchor="ctr">
             <a:normAutofit/>
           </a:bodyPr>
           <a:lstStyle/>
@@ -10329,8 +10787,8 @@
         </p:nvSpPr>
         <p:spPr>
           <a:xfrm>
-            <a:off x="677334" y="2160589"/>
-            <a:ext cx="3957349" cy="3749323"/>
+            <a:off x="685167" y="2160589"/>
+            <a:ext cx="3720916" cy="3560733"/>
           </a:xfrm>
         </p:spPr>
         <p:txBody>
@@ -10345,11 +10803,11 @@
               </a:lnSpc>
             </a:pPr>
             <a:r>
-              <a:rPr lang="en-US" sz="1500" b="1" u="sng"/>
+              <a:rPr lang="en-US" sz="1400" b="1" u="sng" dirty="0"/>
               <a:t>Inheritance</a:t>
             </a:r>
             <a:r>
-              <a:rPr lang="en-US" sz="1500"/>
+              <a:rPr lang="en-US" sz="1400" dirty="0"/>
               <a:t> is the process of creating a class from an existing class. </a:t>
             </a:r>
           </a:p>
@@ -10360,7 +10818,7 @@
               </a:lnSpc>
             </a:pPr>
             <a:r>
-              <a:rPr lang="en-US" sz="1500"/>
+              <a:rPr lang="en-US" sz="1400" dirty="0"/>
               <a:t>The new class will have all of the original class’s state and behavior, but will also add its own, making it bigger.</a:t>
             </a:r>
           </a:p>
@@ -10371,23 +10829,23 @@
               </a:lnSpc>
             </a:pPr>
             <a:r>
-              <a:rPr lang="en-US" sz="1500"/>
+              <a:rPr lang="en-US" sz="1400" dirty="0"/>
               <a:t>The new class is called a </a:t>
             </a:r>
             <a:r>
-              <a:rPr lang="en-US" sz="1500" b="1" u="sng"/>
+              <a:rPr lang="en-US" sz="1400" b="1" u="sng" dirty="0"/>
               <a:t>subclass</a:t>
             </a:r>
             <a:r>
-              <a:rPr lang="en-US" sz="1500"/>
+              <a:rPr lang="en-US" sz="1400" dirty="0"/>
               <a:t> and the original class is called a </a:t>
             </a:r>
             <a:r>
-              <a:rPr lang="en-US" sz="1500" b="1" u="sng"/>
+              <a:rPr lang="en-US" sz="1400" b="1" u="sng" dirty="0"/>
               <a:t>superclass</a:t>
             </a:r>
             <a:r>
-              <a:rPr lang="en-US" sz="1500"/>
+              <a:rPr lang="en-US" sz="1400" dirty="0"/>
               <a:t>.</a:t>
             </a:r>
           </a:p>
@@ -10398,8 +10856,16 @@
               </a:lnSpc>
             </a:pPr>
             <a:r>
-              <a:rPr lang="en-US" sz="1500"/>
-              <a:t>This is great because it allows for some code to only be written and tested in a superclass, them used in subclasses.</a:t>
+              <a:rPr lang="en-US" sz="1400" dirty="0"/>
+              <a:t>This is great because it allows for some code to only be written and tested once in a superclass</a:t>
+            </a:r>
+            <a:r>
+              <a:rPr lang="en-US" sz="1400"/>
+              <a:t>, then </a:t>
+            </a:r>
+            <a:r>
+              <a:rPr lang="en-US" sz="1400" dirty="0"/>
+              <a:t>used in subclasses.</a:t>
             </a:r>
           </a:p>
           <a:p>
@@ -10409,15 +10875,15 @@
               </a:lnSpc>
             </a:pPr>
             <a:r>
-              <a:rPr lang="en-US" sz="1500"/>
+              <a:rPr lang="en-US" sz="1400" dirty="0"/>
               <a:t>A subclass of a class can be a superclass for another class, which leads to an </a:t>
             </a:r>
             <a:r>
-              <a:rPr lang="en-US" sz="1500" b="1" u="sng"/>
+              <a:rPr lang="en-US" sz="1400" b="1" u="sng" dirty="0"/>
               <a:t>inheritance hierarchy</a:t>
             </a:r>
             <a:r>
-              <a:rPr lang="en-US" sz="1500"/>
+              <a:rPr lang="en-US" sz="1400" dirty="0"/>
               <a:t>.</a:t>
             </a:r>
           </a:p>
@@ -10425,10 +10891,10 @@
       </p:sp>
       <p:pic>
         <p:nvPicPr>
-          <p:cNvPr id="7" name="Picture 6" descr="A screenshot of a cell phone&#10;&#10;Description automatically generated">
+          <p:cNvPr id="5" name="Picture 4" descr="A picture containing screenshot&#10;&#10;Description automatically generated">
             <a:extLst>
               <a:ext uri="{FF2B5EF4-FFF2-40B4-BE49-F238E27FC236}">
-                <a16:creationId xmlns:a16="http://schemas.microsoft.com/office/drawing/2014/main" id="{18B85371-D98B-48FC-83EA-87D66A2ACBA7}"/>
+                <a16:creationId xmlns:a16="http://schemas.microsoft.com/office/drawing/2014/main" id="{5AFED24B-8C26-4DB8-AD83-9FF7DC466E79}"/>
               </a:ext>
             </a:extLst>
           </p:cNvPr>
@@ -10445,8 +10911,8 @@
         </p:blipFill>
         <p:spPr>
           <a:xfrm>
-            <a:off x="4987137" y="2159331"/>
-            <a:ext cx="4204989" cy="3742439"/>
+            <a:off x="4654035" y="1210868"/>
+            <a:ext cx="4602747" cy="3931731"/>
           </a:xfrm>
           <a:prstGeom prst="rect">
             <a:avLst/>
@@ -10684,10 +11150,10 @@
       </p:sp>
       <p:pic>
         <p:nvPicPr>
-          <p:cNvPr id="5" name="Picture 4" descr="A screenshot of a cell phone&#10;&#10;Description automatically generated">
+          <p:cNvPr id="6" name="Picture 5" descr="A picture containing screenshot&#10;&#10;Description automatically generated">
             <a:extLst>
               <a:ext uri="{FF2B5EF4-FFF2-40B4-BE49-F238E27FC236}">
-                <a16:creationId xmlns:a16="http://schemas.microsoft.com/office/drawing/2014/main" id="{C43827E3-E358-479D-871B-6C6F87AE8C60}"/>
+                <a16:creationId xmlns:a16="http://schemas.microsoft.com/office/drawing/2014/main" id="{392E23FE-8341-4882-8AFB-5DE45A517AB3}"/>
               </a:ext>
             </a:extLst>
           </p:cNvPr>
@@ -10704,8 +11170,8 @@
         </p:blipFill>
         <p:spPr>
           <a:xfrm>
-            <a:off x="4654035" y="1128512"/>
-            <a:ext cx="4602747" cy="4096444"/>
+            <a:off x="4654035" y="1210868"/>
+            <a:ext cx="4602747" cy="3931731"/>
           </a:xfrm>
           <a:prstGeom prst="rect">
             <a:avLst/>
@@ -10716,6 +11182,1713 @@
     <p:extLst>
       <p:ext uri="{BB962C8B-B14F-4D97-AF65-F5344CB8AC3E}">
         <p14:creationId xmlns:p14="http://schemas.microsoft.com/office/powerpoint/2010/main" val="804555844"/>
+      </p:ext>
+    </p:extLst>
+  </p:cSld>
+  <p:clrMapOvr>
+    <a:masterClrMapping/>
+  </p:clrMapOvr>
+</p:sld>
+</file>
+
+<file path=ppt/slides/slide8.xml><?xml version="1.0" encoding="utf-8"?>
+<p:sld xmlns:a="http://schemas.openxmlformats.org/drawingml/2006/main" xmlns:r="http://schemas.openxmlformats.org/officeDocument/2006/relationships" xmlns:p="http://schemas.openxmlformats.org/presentationml/2006/main">
+  <p:cSld>
+    <p:bg>
+      <p:bgPr>
+        <a:solidFill>
+          <a:schemeClr val="bg1"/>
+        </a:solidFill>
+        <a:effectLst/>
+      </p:bgPr>
+    </p:bg>
+    <p:spTree>
+      <p:nvGrpSpPr>
+        <p:cNvPr id="1" name=""/>
+        <p:cNvGrpSpPr/>
+        <p:nvPr/>
+      </p:nvGrpSpPr>
+      <p:grpSpPr>
+        <a:xfrm>
+          <a:off x="0" y="0"/>
+          <a:ext cx="0" cy="0"/>
+          <a:chOff x="0" y="0"/>
+          <a:chExt cx="0" cy="0"/>
+        </a:xfrm>
+      </p:grpSpPr>
+      <p:grpSp>
+        <p:nvGrpSpPr>
+          <p:cNvPr id="26" name="Group 25">
+            <a:extLst>
+              <a:ext uri="{FF2B5EF4-FFF2-40B4-BE49-F238E27FC236}">
+                <a16:creationId xmlns:a16="http://schemas.microsoft.com/office/drawing/2014/main" id="{4815A7B4-532E-48C9-AC24-D78ACF3339DB}"/>
+              </a:ext>
+              <a:ext uri="{C183D7F6-B498-43B3-948B-1728B52AA6E4}">
+                <adec:decorative xmlns:adec="http://schemas.microsoft.com/office/drawing/2017/decorative" val="1"/>
+              </a:ext>
+            </a:extLst>
+          </p:cNvPr>
+          <p:cNvGrpSpPr>
+            <a:grpSpLocks noGrp="1" noUngrp="1" noRot="1" noChangeAspect="1" noMove="1" noResize="1"/>
+          </p:cNvGrpSpPr>
+          <p:nvPr>
+            <p:extLst>
+              <p:ext uri="{386F3935-93C4-4BCD-93E2-E3B085C9AB24}">
+                <p16:designElem xmlns:p16="http://schemas.microsoft.com/office/powerpoint/2015/main" val="1"/>
+              </p:ext>
+            </p:extLst>
+          </p:nvPr>
+        </p:nvGrpSpPr>
+        <p:grpSpPr>
+          <a:xfrm>
+            <a:off x="0" y="-8467"/>
+            <a:ext cx="12192000" cy="6866467"/>
+            <a:chOff x="0" y="-8467"/>
+            <a:chExt cx="12192000" cy="6866467"/>
+          </a:xfrm>
+        </p:grpSpPr>
+        <p:sp>
+          <p:nvSpPr>
+            <p:cNvPr id="27" name="Freeform 14">
+              <a:extLst>
+                <a:ext uri="{FF2B5EF4-FFF2-40B4-BE49-F238E27FC236}">
+                  <a16:creationId xmlns:a16="http://schemas.microsoft.com/office/drawing/2014/main" id="{D40109F4-CE5C-45F4-856E-F3F69C9FD4E1}"/>
+                </a:ext>
+                <a:ext uri="{C183D7F6-B498-43B3-948B-1728B52AA6E4}">
+                  <adec:decorative xmlns:adec="http://schemas.microsoft.com/office/drawing/2017/decorative" val="1"/>
+                </a:ext>
+              </a:extLst>
+            </p:cNvPr>
+            <p:cNvSpPr/>
+            <p:nvPr>
+              <p:extLst>
+                <p:ext uri="{386F3935-93C4-4BCD-93E2-E3B085C9AB24}">
+                  <p16:designElem xmlns:p16="http://schemas.microsoft.com/office/powerpoint/2015/main" val="1"/>
+                </p:ext>
+              </p:extLst>
+            </p:nvPr>
+          </p:nvSpPr>
+          <p:spPr>
+            <a:xfrm>
+              <a:off x="0" y="-7862"/>
+              <a:ext cx="863600" cy="5698067"/>
+            </a:xfrm>
+            <a:custGeom>
+              <a:avLst/>
+              <a:gdLst/>
+              <a:ahLst/>
+              <a:cxnLst/>
+              <a:rect l="l" t="t" r="r" b="b"/>
+              <a:pathLst>
+                <a:path w="863600" h="5698067">
+                  <a:moveTo>
+                    <a:pt x="0" y="8467"/>
+                  </a:moveTo>
+                  <a:lnTo>
+                    <a:pt x="863600" y="0"/>
+                  </a:lnTo>
+                  <a:lnTo>
+                    <a:pt x="863600" y="16934"/>
+                  </a:lnTo>
+                  <a:lnTo>
+                    <a:pt x="0" y="5698067"/>
+                  </a:lnTo>
+                  <a:lnTo>
+                    <a:pt x="0" y="8467"/>
+                  </a:lnTo>
+                  <a:close/>
+                </a:path>
+              </a:pathLst>
+            </a:custGeom>
+            <a:solidFill>
+              <a:schemeClr val="accent1">
+                <a:alpha val="70000"/>
+              </a:schemeClr>
+            </a:solidFill>
+            <a:ln>
+              <a:noFill/>
+            </a:ln>
+            <a:effectLst/>
+          </p:spPr>
+          <p:style>
+            <a:lnRef idx="1">
+              <a:schemeClr val="accent1"/>
+            </a:lnRef>
+            <a:fillRef idx="3">
+              <a:schemeClr val="accent1"/>
+            </a:fillRef>
+            <a:effectRef idx="2">
+              <a:schemeClr val="accent1"/>
+            </a:effectRef>
+            <a:fontRef idx="minor">
+              <a:schemeClr val="lt1"/>
+            </a:fontRef>
+          </p:style>
+        </p:sp>
+        <p:cxnSp>
+          <p:nvCxnSpPr>
+            <p:cNvPr id="28" name="Straight Connector 27">
+              <a:extLst>
+                <a:ext uri="{FF2B5EF4-FFF2-40B4-BE49-F238E27FC236}">
+                  <a16:creationId xmlns:a16="http://schemas.microsoft.com/office/drawing/2014/main" id="{3CBAA4DE-3D7B-460B-AE98-D9F9990C0B62}"/>
+                </a:ext>
+                <a:ext uri="{C183D7F6-B498-43B3-948B-1728B52AA6E4}">
+                  <adec:decorative xmlns:adec="http://schemas.microsoft.com/office/drawing/2017/decorative" val="1"/>
+                </a:ext>
+              </a:extLst>
+            </p:cNvPr>
+            <p:cNvCxnSpPr/>
+            <p:nvPr>
+              <p:extLst>
+                <p:ext uri="{386F3935-93C4-4BCD-93E2-E3B085C9AB24}">
+                  <p16:designElem xmlns:p16="http://schemas.microsoft.com/office/powerpoint/2015/main" val="1"/>
+                </p:ext>
+              </p:extLst>
+            </p:nvPr>
+          </p:nvCxnSpPr>
+          <p:spPr>
+            <a:xfrm>
+              <a:off x="9371012" y="0"/>
+              <a:ext cx="1219200" cy="6858000"/>
+            </a:xfrm>
+            <a:prstGeom prst="line">
+              <a:avLst/>
+            </a:prstGeom>
+            <a:ln w="9525">
+              <a:solidFill>
+                <a:schemeClr val="accent1">
+                  <a:alpha val="70000"/>
+                </a:schemeClr>
+              </a:solidFill>
+            </a:ln>
+          </p:spPr>
+          <p:style>
+            <a:lnRef idx="2">
+              <a:schemeClr val="accent1"/>
+            </a:lnRef>
+            <a:fillRef idx="0">
+              <a:schemeClr val="accent1"/>
+            </a:fillRef>
+            <a:effectRef idx="1">
+              <a:schemeClr val="accent1"/>
+            </a:effectRef>
+            <a:fontRef idx="minor">
+              <a:schemeClr val="tx1"/>
+            </a:fontRef>
+          </p:style>
+        </p:cxnSp>
+        <p:cxnSp>
+          <p:nvCxnSpPr>
+            <p:cNvPr id="29" name="Straight Connector 28">
+              <a:extLst>
+                <a:ext uri="{FF2B5EF4-FFF2-40B4-BE49-F238E27FC236}">
+                  <a16:creationId xmlns:a16="http://schemas.microsoft.com/office/drawing/2014/main" id="{7BF1ED3E-4F80-4AF6-A41B-44F53DDE610D}"/>
+                </a:ext>
+                <a:ext uri="{C183D7F6-B498-43B3-948B-1728B52AA6E4}">
+                  <adec:decorative xmlns:adec="http://schemas.microsoft.com/office/drawing/2017/decorative" val="1"/>
+                </a:ext>
+              </a:extLst>
+            </p:cNvPr>
+            <p:cNvCxnSpPr/>
+            <p:nvPr>
+              <p:extLst>
+                <p:ext uri="{386F3935-93C4-4BCD-93E2-E3B085C9AB24}">
+                  <p16:designElem xmlns:p16="http://schemas.microsoft.com/office/powerpoint/2015/main" val="1"/>
+                </p:ext>
+              </p:extLst>
+            </p:nvPr>
+          </p:nvCxnSpPr>
+          <p:spPr>
+            <a:xfrm flipH="1">
+              <a:off x="7425267" y="3681413"/>
+              <a:ext cx="4763558" cy="3176587"/>
+            </a:xfrm>
+            <a:prstGeom prst="line">
+              <a:avLst/>
+            </a:prstGeom>
+            <a:ln w="9525">
+              <a:solidFill>
+                <a:schemeClr val="accent1">
+                  <a:alpha val="70000"/>
+                </a:schemeClr>
+              </a:solidFill>
+            </a:ln>
+          </p:spPr>
+          <p:style>
+            <a:lnRef idx="2">
+              <a:schemeClr val="accent1"/>
+            </a:lnRef>
+            <a:fillRef idx="0">
+              <a:schemeClr val="accent1"/>
+            </a:fillRef>
+            <a:effectRef idx="1">
+              <a:schemeClr val="accent1"/>
+            </a:effectRef>
+            <a:fontRef idx="minor">
+              <a:schemeClr val="tx1"/>
+            </a:fontRef>
+          </p:style>
+        </p:cxnSp>
+        <p:sp>
+          <p:nvSpPr>
+            <p:cNvPr id="30" name="Rectangle 23">
+              <a:extLst>
+                <a:ext uri="{FF2B5EF4-FFF2-40B4-BE49-F238E27FC236}">
+                  <a16:creationId xmlns:a16="http://schemas.microsoft.com/office/drawing/2014/main" id="{C0B2D747-3E31-45C5-9A98-A9710A585FBB}"/>
+                </a:ext>
+                <a:ext uri="{C183D7F6-B498-43B3-948B-1728B52AA6E4}">
+                  <adec:decorative xmlns:adec="http://schemas.microsoft.com/office/drawing/2017/decorative" val="1"/>
+                </a:ext>
+              </a:extLst>
+            </p:cNvPr>
+            <p:cNvSpPr/>
+            <p:nvPr>
+              <p:extLst>
+                <p:ext uri="{386F3935-93C4-4BCD-93E2-E3B085C9AB24}">
+                  <p16:designElem xmlns:p16="http://schemas.microsoft.com/office/powerpoint/2015/main" val="1"/>
+                </p:ext>
+              </p:extLst>
+            </p:nvPr>
+          </p:nvSpPr>
+          <p:spPr>
+            <a:xfrm>
+              <a:off x="9181476" y="-8467"/>
+              <a:ext cx="3007349" cy="6866467"/>
+            </a:xfrm>
+            <a:custGeom>
+              <a:avLst/>
+              <a:gdLst/>
+              <a:ahLst/>
+              <a:cxnLst/>
+              <a:rect l="l" t="t" r="r" b="b"/>
+              <a:pathLst>
+                <a:path w="3007349" h="6866467">
+                  <a:moveTo>
+                    <a:pt x="2045532" y="0"/>
+                  </a:moveTo>
+                  <a:lnTo>
+                    <a:pt x="3007349" y="0"/>
+                  </a:lnTo>
+                  <a:lnTo>
+                    <a:pt x="3007349" y="6866467"/>
+                  </a:lnTo>
+                  <a:lnTo>
+                    <a:pt x="0" y="6866467"/>
+                  </a:lnTo>
+                  <a:lnTo>
+                    <a:pt x="2045532" y="0"/>
+                  </a:lnTo>
+                  <a:close/>
+                </a:path>
+              </a:pathLst>
+            </a:custGeom>
+            <a:solidFill>
+              <a:schemeClr val="accent1">
+                <a:alpha val="36000"/>
+              </a:schemeClr>
+            </a:solidFill>
+            <a:ln>
+              <a:noFill/>
+            </a:ln>
+            <a:effectLst/>
+          </p:spPr>
+          <p:style>
+            <a:lnRef idx="1">
+              <a:schemeClr val="accent1"/>
+            </a:lnRef>
+            <a:fillRef idx="3">
+              <a:schemeClr val="accent1"/>
+            </a:fillRef>
+            <a:effectRef idx="2">
+              <a:schemeClr val="accent1"/>
+            </a:effectRef>
+            <a:fontRef idx="minor">
+              <a:schemeClr val="lt1"/>
+            </a:fontRef>
+          </p:style>
+        </p:sp>
+        <p:sp>
+          <p:nvSpPr>
+            <p:cNvPr id="31" name="Rectangle 25">
+              <a:extLst>
+                <a:ext uri="{FF2B5EF4-FFF2-40B4-BE49-F238E27FC236}">
+                  <a16:creationId xmlns:a16="http://schemas.microsoft.com/office/drawing/2014/main" id="{A15FD4BA-3020-462D-8BE8-B3A65B8E492A}"/>
+                </a:ext>
+                <a:ext uri="{C183D7F6-B498-43B3-948B-1728B52AA6E4}">
+                  <adec:decorative xmlns:adec="http://schemas.microsoft.com/office/drawing/2017/decorative" val="1"/>
+                </a:ext>
+              </a:extLst>
+            </p:cNvPr>
+            <p:cNvSpPr/>
+            <p:nvPr>
+              <p:extLst>
+                <p:ext uri="{386F3935-93C4-4BCD-93E2-E3B085C9AB24}">
+                  <p16:designElem xmlns:p16="http://schemas.microsoft.com/office/powerpoint/2015/main" val="1"/>
+                </p:ext>
+              </p:extLst>
+            </p:nvPr>
+          </p:nvSpPr>
+          <p:spPr>
+            <a:xfrm>
+              <a:off x="9603442" y="-8467"/>
+              <a:ext cx="2588558" cy="6866467"/>
+            </a:xfrm>
+            <a:custGeom>
+              <a:avLst/>
+              <a:gdLst/>
+              <a:ahLst/>
+              <a:cxnLst/>
+              <a:rect l="l" t="t" r="r" b="b"/>
+              <a:pathLst>
+                <a:path w="2573311" h="6866467">
+                  <a:moveTo>
+                    <a:pt x="0" y="0"/>
+                  </a:moveTo>
+                  <a:lnTo>
+                    <a:pt x="2573311" y="0"/>
+                  </a:lnTo>
+                  <a:lnTo>
+                    <a:pt x="2573311" y="6866467"/>
+                  </a:lnTo>
+                  <a:lnTo>
+                    <a:pt x="1202336" y="6866467"/>
+                  </a:lnTo>
+                  <a:lnTo>
+                    <a:pt x="0" y="0"/>
+                  </a:lnTo>
+                  <a:close/>
+                </a:path>
+              </a:pathLst>
+            </a:custGeom>
+            <a:solidFill>
+              <a:schemeClr val="accent1">
+                <a:alpha val="20000"/>
+              </a:schemeClr>
+            </a:solidFill>
+            <a:ln>
+              <a:noFill/>
+            </a:ln>
+            <a:effectLst/>
+          </p:spPr>
+          <p:style>
+            <a:lnRef idx="1">
+              <a:schemeClr val="accent1"/>
+            </a:lnRef>
+            <a:fillRef idx="3">
+              <a:schemeClr val="accent1"/>
+            </a:fillRef>
+            <a:effectRef idx="2">
+              <a:schemeClr val="accent1"/>
+            </a:effectRef>
+            <a:fontRef idx="minor">
+              <a:schemeClr val="lt1"/>
+            </a:fontRef>
+          </p:style>
+        </p:sp>
+        <p:sp>
+          <p:nvSpPr>
+            <p:cNvPr id="32" name="Isosceles Triangle 31">
+              <a:extLst>
+                <a:ext uri="{FF2B5EF4-FFF2-40B4-BE49-F238E27FC236}">
+                  <a16:creationId xmlns:a16="http://schemas.microsoft.com/office/drawing/2014/main" id="{A304284A-7318-4DD5-898C-2F6B23C778FA}"/>
+                </a:ext>
+                <a:ext uri="{C183D7F6-B498-43B3-948B-1728B52AA6E4}">
+                  <adec:decorative xmlns:adec="http://schemas.microsoft.com/office/drawing/2017/decorative" val="1"/>
+                </a:ext>
+              </a:extLst>
+            </p:cNvPr>
+            <p:cNvSpPr/>
+            <p:nvPr>
+              <p:extLst>
+                <p:ext uri="{386F3935-93C4-4BCD-93E2-E3B085C9AB24}">
+                  <p16:designElem xmlns:p16="http://schemas.microsoft.com/office/powerpoint/2015/main" val="1"/>
+                </p:ext>
+              </p:extLst>
+            </p:nvPr>
+          </p:nvSpPr>
+          <p:spPr>
+            <a:xfrm>
+              <a:off x="8932333" y="3048000"/>
+              <a:ext cx="3259667" cy="3810000"/>
+            </a:xfrm>
+            <a:prstGeom prst="triangle">
+              <a:avLst>
+                <a:gd name="adj" fmla="val 100000"/>
+              </a:avLst>
+            </a:prstGeom>
+            <a:solidFill>
+              <a:schemeClr val="accent1">
+                <a:lumMod val="75000"/>
+                <a:alpha val="66000"/>
+              </a:schemeClr>
+            </a:solidFill>
+            <a:ln>
+              <a:noFill/>
+            </a:ln>
+            <a:effectLst/>
+          </p:spPr>
+          <p:style>
+            <a:lnRef idx="1">
+              <a:schemeClr val="accent1"/>
+            </a:lnRef>
+            <a:fillRef idx="3">
+              <a:schemeClr val="accent1"/>
+            </a:fillRef>
+            <a:effectRef idx="2">
+              <a:schemeClr val="accent1"/>
+            </a:effectRef>
+            <a:fontRef idx="minor">
+              <a:schemeClr val="lt1"/>
+            </a:fontRef>
+          </p:style>
+        </p:sp>
+        <p:sp>
+          <p:nvSpPr>
+            <p:cNvPr id="33" name="Rectangle 27">
+              <a:extLst>
+                <a:ext uri="{FF2B5EF4-FFF2-40B4-BE49-F238E27FC236}">
+                  <a16:creationId xmlns:a16="http://schemas.microsoft.com/office/drawing/2014/main" id="{9DF48E66-B635-4509-B115-E0987C014EBC}"/>
+                </a:ext>
+                <a:ext uri="{C183D7F6-B498-43B3-948B-1728B52AA6E4}">
+                  <adec:decorative xmlns:adec="http://schemas.microsoft.com/office/drawing/2017/decorative" val="1"/>
+                </a:ext>
+              </a:extLst>
+            </p:cNvPr>
+            <p:cNvSpPr/>
+            <p:nvPr>
+              <p:extLst>
+                <p:ext uri="{386F3935-93C4-4BCD-93E2-E3B085C9AB24}">
+                  <p16:designElem xmlns:p16="http://schemas.microsoft.com/office/powerpoint/2015/main" val="1"/>
+                </p:ext>
+              </p:extLst>
+            </p:nvPr>
+          </p:nvSpPr>
+          <p:spPr>
+            <a:xfrm>
+              <a:off x="9334500" y="-8467"/>
+              <a:ext cx="2854326" cy="6866467"/>
+            </a:xfrm>
+            <a:custGeom>
+              <a:avLst/>
+              <a:gdLst/>
+              <a:ahLst/>
+              <a:cxnLst/>
+              <a:rect l="l" t="t" r="r" b="b"/>
+              <a:pathLst>
+                <a:path w="2858013" h="6866467">
+                  <a:moveTo>
+                    <a:pt x="0" y="0"/>
+                  </a:moveTo>
+                  <a:lnTo>
+                    <a:pt x="2858013" y="0"/>
+                  </a:lnTo>
+                  <a:lnTo>
+                    <a:pt x="2858013" y="6866467"/>
+                  </a:lnTo>
+                  <a:lnTo>
+                    <a:pt x="2473942" y="6866467"/>
+                  </a:lnTo>
+                  <a:lnTo>
+                    <a:pt x="0" y="0"/>
+                  </a:lnTo>
+                  <a:close/>
+                </a:path>
+              </a:pathLst>
+            </a:custGeom>
+            <a:solidFill>
+              <a:schemeClr val="accent1">
+                <a:lumMod val="75000"/>
+                <a:alpha val="50000"/>
+              </a:schemeClr>
+            </a:solidFill>
+            <a:ln>
+              <a:noFill/>
+            </a:ln>
+            <a:effectLst/>
+          </p:spPr>
+          <p:style>
+            <a:lnRef idx="1">
+              <a:schemeClr val="accent1"/>
+            </a:lnRef>
+            <a:fillRef idx="3">
+              <a:schemeClr val="accent1"/>
+            </a:fillRef>
+            <a:effectRef idx="2">
+              <a:schemeClr val="accent1"/>
+            </a:effectRef>
+            <a:fontRef idx="minor">
+              <a:schemeClr val="lt1"/>
+            </a:fontRef>
+          </p:style>
+        </p:sp>
+        <p:sp>
+          <p:nvSpPr>
+            <p:cNvPr id="34" name="Rectangle 28">
+              <a:extLst>
+                <a:ext uri="{FF2B5EF4-FFF2-40B4-BE49-F238E27FC236}">
+                  <a16:creationId xmlns:a16="http://schemas.microsoft.com/office/drawing/2014/main" id="{E3B96D94-5F5A-4F4C-810C-917BF4D266C3}"/>
+                </a:ext>
+                <a:ext uri="{C183D7F6-B498-43B3-948B-1728B52AA6E4}">
+                  <adec:decorative xmlns:adec="http://schemas.microsoft.com/office/drawing/2017/decorative" val="1"/>
+                </a:ext>
+              </a:extLst>
+            </p:cNvPr>
+            <p:cNvSpPr/>
+            <p:nvPr>
+              <p:extLst>
+                <p:ext uri="{386F3935-93C4-4BCD-93E2-E3B085C9AB24}">
+                  <p16:designElem xmlns:p16="http://schemas.microsoft.com/office/powerpoint/2015/main" val="1"/>
+                </p:ext>
+              </p:extLst>
+            </p:nvPr>
+          </p:nvSpPr>
+          <p:spPr>
+            <a:xfrm>
+              <a:off x="10898730" y="-8467"/>
+              <a:ext cx="1290094" cy="6866467"/>
+            </a:xfrm>
+            <a:custGeom>
+              <a:avLst/>
+              <a:gdLst/>
+              <a:ahLst/>
+              <a:cxnLst/>
+              <a:rect l="l" t="t" r="r" b="b"/>
+              <a:pathLst>
+                <a:path w="1290094" h="6858000">
+                  <a:moveTo>
+                    <a:pt x="1019735" y="0"/>
+                  </a:moveTo>
+                  <a:lnTo>
+                    <a:pt x="1290094" y="0"/>
+                  </a:lnTo>
+                  <a:lnTo>
+                    <a:pt x="1290094" y="6858000"/>
+                  </a:lnTo>
+                  <a:lnTo>
+                    <a:pt x="0" y="6858000"/>
+                  </a:lnTo>
+                  <a:lnTo>
+                    <a:pt x="1019735" y="0"/>
+                  </a:lnTo>
+                  <a:close/>
+                </a:path>
+              </a:pathLst>
+            </a:custGeom>
+            <a:solidFill>
+              <a:schemeClr val="accent2">
+                <a:alpha val="70000"/>
+              </a:schemeClr>
+            </a:solidFill>
+            <a:ln>
+              <a:noFill/>
+            </a:ln>
+            <a:effectLst/>
+          </p:spPr>
+          <p:style>
+            <a:lnRef idx="1">
+              <a:schemeClr val="accent1"/>
+            </a:lnRef>
+            <a:fillRef idx="3">
+              <a:schemeClr val="accent1"/>
+            </a:fillRef>
+            <a:effectRef idx="2">
+              <a:schemeClr val="accent1"/>
+            </a:effectRef>
+            <a:fontRef idx="minor">
+              <a:schemeClr val="lt1"/>
+            </a:fontRef>
+          </p:style>
+        </p:sp>
+        <p:sp>
+          <p:nvSpPr>
+            <p:cNvPr id="35" name="Rectangle 29">
+              <a:extLst>
+                <a:ext uri="{FF2B5EF4-FFF2-40B4-BE49-F238E27FC236}">
+                  <a16:creationId xmlns:a16="http://schemas.microsoft.com/office/drawing/2014/main" id="{7F3782D6-BFF8-4389-9D39-A023ADAA92C1}"/>
+                </a:ext>
+                <a:ext uri="{C183D7F6-B498-43B3-948B-1728B52AA6E4}">
+                  <adec:decorative xmlns:adec="http://schemas.microsoft.com/office/drawing/2017/decorative" val="1"/>
+                </a:ext>
+              </a:extLst>
+            </p:cNvPr>
+            <p:cNvSpPr/>
+            <p:nvPr>
+              <p:extLst>
+                <p:ext uri="{386F3935-93C4-4BCD-93E2-E3B085C9AB24}">
+                  <p16:designElem xmlns:p16="http://schemas.microsoft.com/office/powerpoint/2015/main" val="1"/>
+                </p:ext>
+              </p:extLst>
+            </p:nvPr>
+          </p:nvSpPr>
+          <p:spPr>
+            <a:xfrm>
+              <a:off x="10938999" y="-8467"/>
+              <a:ext cx="1249825" cy="6866467"/>
+            </a:xfrm>
+            <a:custGeom>
+              <a:avLst/>
+              <a:gdLst/>
+              <a:ahLst/>
+              <a:cxnLst/>
+              <a:rect l="l" t="t" r="r" b="b"/>
+              <a:pathLst>
+                <a:path w="1249825" h="6858000">
+                  <a:moveTo>
+                    <a:pt x="0" y="0"/>
+                  </a:moveTo>
+                  <a:lnTo>
+                    <a:pt x="1249825" y="0"/>
+                  </a:lnTo>
+                  <a:lnTo>
+                    <a:pt x="1249825" y="6858000"/>
+                  </a:lnTo>
+                  <a:lnTo>
+                    <a:pt x="1109382" y="6858000"/>
+                  </a:lnTo>
+                  <a:lnTo>
+                    <a:pt x="0" y="0"/>
+                  </a:lnTo>
+                  <a:close/>
+                </a:path>
+              </a:pathLst>
+            </a:custGeom>
+            <a:solidFill>
+              <a:schemeClr val="accent2">
+                <a:lumMod val="75000"/>
+                <a:alpha val="80000"/>
+              </a:schemeClr>
+            </a:solidFill>
+            <a:ln>
+              <a:noFill/>
+            </a:ln>
+            <a:effectLst/>
+          </p:spPr>
+          <p:style>
+            <a:lnRef idx="1">
+              <a:schemeClr val="accent1"/>
+            </a:lnRef>
+            <a:fillRef idx="3">
+              <a:schemeClr val="accent1"/>
+            </a:fillRef>
+            <a:effectRef idx="2">
+              <a:schemeClr val="accent1"/>
+            </a:effectRef>
+            <a:fontRef idx="minor">
+              <a:schemeClr val="lt1"/>
+            </a:fontRef>
+          </p:style>
+        </p:sp>
+        <p:sp>
+          <p:nvSpPr>
+            <p:cNvPr id="36" name="Isosceles Triangle 35">
+              <a:extLst>
+                <a:ext uri="{FF2B5EF4-FFF2-40B4-BE49-F238E27FC236}">
+                  <a16:creationId xmlns:a16="http://schemas.microsoft.com/office/drawing/2014/main" id="{ECE162D4-FCAE-441B-B5E9-C91DE62124EF}"/>
+                </a:ext>
+                <a:ext uri="{C183D7F6-B498-43B3-948B-1728B52AA6E4}">
+                  <adec:decorative xmlns:adec="http://schemas.microsoft.com/office/drawing/2017/decorative" val="1"/>
+                </a:ext>
+              </a:extLst>
+            </p:cNvPr>
+            <p:cNvSpPr/>
+            <p:nvPr>
+              <p:extLst>
+                <p:ext uri="{386F3935-93C4-4BCD-93E2-E3B085C9AB24}">
+                  <p16:designElem xmlns:p16="http://schemas.microsoft.com/office/powerpoint/2015/main" val="1"/>
+                </p:ext>
+              </p:extLst>
+            </p:nvPr>
+          </p:nvSpPr>
+          <p:spPr>
+            <a:xfrm>
+              <a:off x="10371666" y="3589867"/>
+              <a:ext cx="1817159" cy="3268133"/>
+            </a:xfrm>
+            <a:prstGeom prst="triangle">
+              <a:avLst>
+                <a:gd name="adj" fmla="val 100000"/>
+              </a:avLst>
+            </a:prstGeom>
+            <a:solidFill>
+              <a:schemeClr val="accent1">
+                <a:lumMod val="75000"/>
+                <a:alpha val="66000"/>
+              </a:schemeClr>
+            </a:solidFill>
+            <a:ln>
+              <a:noFill/>
+            </a:ln>
+            <a:effectLst/>
+          </p:spPr>
+          <p:style>
+            <a:lnRef idx="1">
+              <a:schemeClr val="accent1"/>
+            </a:lnRef>
+            <a:fillRef idx="3">
+              <a:schemeClr val="accent1"/>
+            </a:fillRef>
+            <a:effectRef idx="2">
+              <a:schemeClr val="accent1"/>
+            </a:effectRef>
+            <a:fontRef idx="minor">
+              <a:schemeClr val="lt1"/>
+            </a:fontRef>
+          </p:style>
+        </p:sp>
+      </p:grpSp>
+      <p:sp>
+        <p:nvSpPr>
+          <p:cNvPr id="2" name="Title 1">
+            <a:extLst>
+              <a:ext uri="{FF2B5EF4-FFF2-40B4-BE49-F238E27FC236}">
+                <a16:creationId xmlns:a16="http://schemas.microsoft.com/office/drawing/2014/main" id="{533C90F1-5208-4A58-AB66-372B209378BD}"/>
+              </a:ext>
+            </a:extLst>
+          </p:cNvPr>
+          <p:cNvSpPr>
+            <a:spLocks noGrp="1"/>
+          </p:cNvSpPr>
+          <p:nvPr>
+            <p:ph type="title"/>
+          </p:nvPr>
+        </p:nvSpPr>
+        <p:spPr>
+          <a:xfrm>
+            <a:off x="4974337" y="1265314"/>
+            <a:ext cx="4299666" cy="3249131"/>
+          </a:xfrm>
+        </p:spPr>
+        <p:txBody>
+          <a:bodyPr vert="horz" lIns="91440" tIns="45720" rIns="91440" bIns="45720" rtlCol="0" anchor="b">
+            <a:normAutofit/>
+          </a:bodyPr>
+          <a:lstStyle/>
+          <a:p>
+            <a:r>
+              <a:rPr lang="en-US" sz="5400"/>
+              <a:t>Example 1 UML</a:t>
+            </a:r>
+          </a:p>
+        </p:txBody>
+      </p:sp>
+      <p:sp>
+        <p:nvSpPr>
+          <p:cNvPr id="38" name="Isosceles Triangle 37">
+            <a:extLst>
+              <a:ext uri="{FF2B5EF4-FFF2-40B4-BE49-F238E27FC236}">
+                <a16:creationId xmlns:a16="http://schemas.microsoft.com/office/drawing/2014/main" id="{DC99427B-A97E-40A3-B1FD-4557346C6A91}"/>
+              </a:ext>
+              <a:ext uri="{C183D7F6-B498-43B3-948B-1728B52AA6E4}">
+                <adec:decorative xmlns:adec="http://schemas.microsoft.com/office/drawing/2017/decorative" val="1"/>
+              </a:ext>
+            </a:extLst>
+          </p:cNvPr>
+          <p:cNvSpPr>
+            <a:spLocks noGrp="1" noRot="1" noChangeAspect="1" noMove="1" noResize="1" noEditPoints="1" noAdjustHandles="1" noChangeArrowheads="1" noChangeShapeType="1" noTextEdit="1"/>
+          </p:cNvSpPr>
+          <p:nvPr>
+            <p:extLst>
+              <p:ext uri="{386F3935-93C4-4BCD-93E2-E3B085C9AB24}">
+                <p16:designElem xmlns:p16="http://schemas.microsoft.com/office/powerpoint/2015/main" val="1"/>
+              </p:ext>
+            </p:extLst>
+          </p:nvPr>
+        </p:nvSpPr>
+        <p:spPr>
+          <a:xfrm rot="10800000">
+            <a:off x="3174" y="12700"/>
+            <a:ext cx="842596" cy="5666154"/>
+          </a:xfrm>
+          <a:prstGeom prst="triangle">
+            <a:avLst>
+              <a:gd name="adj" fmla="val 100000"/>
+            </a:avLst>
+          </a:prstGeom>
+          <a:solidFill>
+            <a:schemeClr val="accent1">
+              <a:alpha val="85000"/>
+            </a:schemeClr>
+          </a:solidFill>
+          <a:ln>
+            <a:noFill/>
+          </a:ln>
+          <a:effectLst/>
+        </p:spPr>
+        <p:style>
+          <a:lnRef idx="1">
+            <a:schemeClr val="accent1"/>
+          </a:lnRef>
+          <a:fillRef idx="3">
+            <a:schemeClr val="accent1"/>
+          </a:fillRef>
+          <a:effectRef idx="2">
+            <a:schemeClr val="accent1"/>
+          </a:effectRef>
+          <a:fontRef idx="minor">
+            <a:schemeClr val="lt1"/>
+          </a:fontRef>
+        </p:style>
+      </p:sp>
+      <p:pic>
+        <p:nvPicPr>
+          <p:cNvPr id="6" name="Picture Placeholder 5" descr="A screenshot of a cell phone&#10;&#10;Description automatically generated">
+            <a:extLst>
+              <a:ext uri="{FF2B5EF4-FFF2-40B4-BE49-F238E27FC236}">
+                <a16:creationId xmlns:a16="http://schemas.microsoft.com/office/drawing/2014/main" id="{78980F43-EB2F-4CA3-B463-CDE262D4F17B}"/>
+              </a:ext>
+            </a:extLst>
+          </p:cNvPr>
+          <p:cNvPicPr>
+            <a:picLocks noGrp="1" noChangeAspect="1"/>
+          </p:cNvPicPr>
+          <p:nvPr>
+            <p:ph type="pic" idx="1"/>
+          </p:nvPr>
+        </p:nvPicPr>
+        <p:blipFill rotWithShape="1">
+          <a:blip r:embed="rId2"/>
+          <a:srcRect l="3362" r="3361" b="-1"/>
+          <a:stretch/>
+        </p:blipFill>
+        <p:spPr>
+          <a:xfrm>
+            <a:off x="907558" y="1265315"/>
+            <a:ext cx="3746737" cy="4335340"/>
+          </a:xfrm>
+          <a:prstGeom prst="rect">
+            <a:avLst/>
+          </a:prstGeom>
+        </p:spPr>
+      </p:pic>
+    </p:spTree>
+    <p:extLst>
+      <p:ext uri="{BB962C8B-B14F-4D97-AF65-F5344CB8AC3E}">
+        <p14:creationId xmlns:p14="http://schemas.microsoft.com/office/powerpoint/2010/main" val="1368281083"/>
+      </p:ext>
+    </p:extLst>
+  </p:cSld>
+  <p:clrMapOvr>
+    <a:masterClrMapping/>
+  </p:clrMapOvr>
+</p:sld>
+</file>
+
+<file path=ppt/slides/slide9.xml><?xml version="1.0" encoding="utf-8"?>
+<p:sld xmlns:a="http://schemas.openxmlformats.org/drawingml/2006/main" xmlns:r="http://schemas.openxmlformats.org/officeDocument/2006/relationships" xmlns:p="http://schemas.openxmlformats.org/presentationml/2006/main">
+  <p:cSld>
+    <p:bg>
+      <p:bgPr>
+        <a:solidFill>
+          <a:schemeClr val="bg1"/>
+        </a:solidFill>
+        <a:effectLst/>
+      </p:bgPr>
+    </p:bg>
+    <p:spTree>
+      <p:nvGrpSpPr>
+        <p:cNvPr id="1" name=""/>
+        <p:cNvGrpSpPr/>
+        <p:nvPr/>
+      </p:nvGrpSpPr>
+      <p:grpSpPr>
+        <a:xfrm>
+          <a:off x="0" y="0"/>
+          <a:ext cx="0" cy="0"/>
+          <a:chOff x="0" y="0"/>
+          <a:chExt cx="0" cy="0"/>
+        </a:xfrm>
+      </p:grpSpPr>
+      <p:grpSp>
+        <p:nvGrpSpPr>
+          <p:cNvPr id="41" name="Group 10">
+            <a:extLst>
+              <a:ext uri="{FF2B5EF4-FFF2-40B4-BE49-F238E27FC236}">
+                <a16:creationId xmlns:a16="http://schemas.microsoft.com/office/drawing/2014/main" id="{A5AFB369-4673-4727-A7CD-D86AFE0AE069}"/>
+              </a:ext>
+              <a:ext uri="{C183D7F6-B498-43B3-948B-1728B52AA6E4}">
+                <adec:decorative xmlns:adec="http://schemas.microsoft.com/office/drawing/2017/decorative" val="1"/>
+              </a:ext>
+            </a:extLst>
+          </p:cNvPr>
+          <p:cNvGrpSpPr>
+            <a:grpSpLocks noGrp="1" noUngrp="1" noRot="1" noChangeAspect="1" noMove="1" noResize="1"/>
+          </p:cNvGrpSpPr>
+          <p:nvPr>
+            <p:extLst>
+              <p:ext uri="{386F3935-93C4-4BCD-93E2-E3B085C9AB24}">
+                <p16:designElem xmlns:p16="http://schemas.microsoft.com/office/powerpoint/2015/main" val="1"/>
+              </p:ext>
+            </p:extLst>
+          </p:nvPr>
+        </p:nvGrpSpPr>
+        <p:grpSpPr>
+          <a:xfrm>
+            <a:off x="0" y="-8467"/>
+            <a:ext cx="12192000" cy="6866467"/>
+            <a:chOff x="0" y="-8467"/>
+            <a:chExt cx="12192000" cy="6866467"/>
+          </a:xfrm>
+        </p:grpSpPr>
+        <p:sp>
+          <p:nvSpPr>
+            <p:cNvPr id="12" name="Freeform 14">
+              <a:extLst>
+                <a:ext uri="{FF2B5EF4-FFF2-40B4-BE49-F238E27FC236}">
+                  <a16:creationId xmlns:a16="http://schemas.microsoft.com/office/drawing/2014/main" id="{50709826-4D6B-4A97-8DB3-5DA16662622F}"/>
+                </a:ext>
+                <a:ext uri="{C183D7F6-B498-43B3-948B-1728B52AA6E4}">
+                  <adec:decorative xmlns:adec="http://schemas.microsoft.com/office/drawing/2017/decorative" val="1"/>
+                </a:ext>
+              </a:extLst>
+            </p:cNvPr>
+            <p:cNvSpPr/>
+            <p:nvPr>
+              <p:extLst>
+                <p:ext uri="{386F3935-93C4-4BCD-93E2-E3B085C9AB24}">
+                  <p16:designElem xmlns:p16="http://schemas.microsoft.com/office/powerpoint/2015/main" val="1"/>
+                </p:ext>
+              </p:extLst>
+            </p:nvPr>
+          </p:nvSpPr>
+          <p:spPr>
+            <a:xfrm>
+              <a:off x="0" y="-7862"/>
+              <a:ext cx="863600" cy="5698067"/>
+            </a:xfrm>
+            <a:custGeom>
+              <a:avLst/>
+              <a:gdLst/>
+              <a:ahLst/>
+              <a:cxnLst/>
+              <a:rect l="l" t="t" r="r" b="b"/>
+              <a:pathLst>
+                <a:path w="863600" h="5698067">
+                  <a:moveTo>
+                    <a:pt x="0" y="8467"/>
+                  </a:moveTo>
+                  <a:lnTo>
+                    <a:pt x="863600" y="0"/>
+                  </a:lnTo>
+                  <a:lnTo>
+                    <a:pt x="863600" y="16934"/>
+                  </a:lnTo>
+                  <a:lnTo>
+                    <a:pt x="0" y="5698067"/>
+                  </a:lnTo>
+                  <a:lnTo>
+                    <a:pt x="0" y="8467"/>
+                  </a:lnTo>
+                  <a:close/>
+                </a:path>
+              </a:pathLst>
+            </a:custGeom>
+            <a:solidFill>
+              <a:schemeClr val="accent1">
+                <a:alpha val="70000"/>
+              </a:schemeClr>
+            </a:solidFill>
+            <a:ln>
+              <a:noFill/>
+            </a:ln>
+            <a:effectLst/>
+          </p:spPr>
+          <p:style>
+            <a:lnRef idx="1">
+              <a:schemeClr val="accent1"/>
+            </a:lnRef>
+            <a:fillRef idx="3">
+              <a:schemeClr val="accent1"/>
+            </a:fillRef>
+            <a:effectRef idx="2">
+              <a:schemeClr val="accent1"/>
+            </a:effectRef>
+            <a:fontRef idx="minor">
+              <a:schemeClr val="lt1"/>
+            </a:fontRef>
+          </p:style>
+        </p:sp>
+        <p:cxnSp>
+          <p:nvCxnSpPr>
+            <p:cNvPr id="13" name="Straight Connector 12">
+              <a:extLst>
+                <a:ext uri="{FF2B5EF4-FFF2-40B4-BE49-F238E27FC236}">
+                  <a16:creationId xmlns:a16="http://schemas.microsoft.com/office/drawing/2014/main" id="{47263F58-6EE6-45B3-9BF2-C0BD5D30A556}"/>
+                </a:ext>
+                <a:ext uri="{C183D7F6-B498-43B3-948B-1728B52AA6E4}">
+                  <adec:decorative xmlns:adec="http://schemas.microsoft.com/office/drawing/2017/decorative" val="1"/>
+                </a:ext>
+              </a:extLst>
+            </p:cNvPr>
+            <p:cNvCxnSpPr/>
+            <p:nvPr>
+              <p:extLst>
+                <p:ext uri="{386F3935-93C4-4BCD-93E2-E3B085C9AB24}">
+                  <p16:designElem xmlns:p16="http://schemas.microsoft.com/office/powerpoint/2015/main" val="1"/>
+                </p:ext>
+              </p:extLst>
+            </p:nvPr>
+          </p:nvCxnSpPr>
+          <p:spPr>
+            <a:xfrm>
+              <a:off x="9371012" y="0"/>
+              <a:ext cx="1219200" cy="6858000"/>
+            </a:xfrm>
+            <a:prstGeom prst="line">
+              <a:avLst/>
+            </a:prstGeom>
+            <a:ln w="9525">
+              <a:solidFill>
+                <a:schemeClr val="accent1">
+                  <a:alpha val="70000"/>
+                </a:schemeClr>
+              </a:solidFill>
+            </a:ln>
+          </p:spPr>
+          <p:style>
+            <a:lnRef idx="2">
+              <a:schemeClr val="accent1"/>
+            </a:lnRef>
+            <a:fillRef idx="0">
+              <a:schemeClr val="accent1"/>
+            </a:fillRef>
+            <a:effectRef idx="1">
+              <a:schemeClr val="accent1"/>
+            </a:effectRef>
+            <a:fontRef idx="minor">
+              <a:schemeClr val="tx1"/>
+            </a:fontRef>
+          </p:style>
+        </p:cxnSp>
+        <p:cxnSp>
+          <p:nvCxnSpPr>
+            <p:cNvPr id="14" name="Straight Connector 13">
+              <a:extLst>
+                <a:ext uri="{FF2B5EF4-FFF2-40B4-BE49-F238E27FC236}">
+                  <a16:creationId xmlns:a16="http://schemas.microsoft.com/office/drawing/2014/main" id="{5197CE03-EB81-4718-BEA1-C2D488961E50}"/>
+                </a:ext>
+                <a:ext uri="{C183D7F6-B498-43B3-948B-1728B52AA6E4}">
+                  <adec:decorative xmlns:adec="http://schemas.microsoft.com/office/drawing/2017/decorative" val="1"/>
+                </a:ext>
+              </a:extLst>
+            </p:cNvPr>
+            <p:cNvCxnSpPr/>
+            <p:nvPr>
+              <p:extLst>
+                <p:ext uri="{386F3935-93C4-4BCD-93E2-E3B085C9AB24}">
+                  <p16:designElem xmlns:p16="http://schemas.microsoft.com/office/powerpoint/2015/main" val="1"/>
+                </p:ext>
+              </p:extLst>
+            </p:nvPr>
+          </p:nvCxnSpPr>
+          <p:spPr>
+            <a:xfrm flipH="1">
+              <a:off x="7425267" y="3681413"/>
+              <a:ext cx="4763558" cy="3176587"/>
+            </a:xfrm>
+            <a:prstGeom prst="line">
+              <a:avLst/>
+            </a:prstGeom>
+            <a:ln w="9525">
+              <a:solidFill>
+                <a:schemeClr val="accent1">
+                  <a:alpha val="70000"/>
+                </a:schemeClr>
+              </a:solidFill>
+            </a:ln>
+          </p:spPr>
+          <p:style>
+            <a:lnRef idx="2">
+              <a:schemeClr val="accent1"/>
+            </a:lnRef>
+            <a:fillRef idx="0">
+              <a:schemeClr val="accent1"/>
+            </a:fillRef>
+            <a:effectRef idx="1">
+              <a:schemeClr val="accent1"/>
+            </a:effectRef>
+            <a:fontRef idx="minor">
+              <a:schemeClr val="tx1"/>
+            </a:fontRef>
+          </p:style>
+        </p:cxnSp>
+        <p:sp>
+          <p:nvSpPr>
+            <p:cNvPr id="15" name="Rectangle 23">
+              <a:extLst>
+                <a:ext uri="{FF2B5EF4-FFF2-40B4-BE49-F238E27FC236}">
+                  <a16:creationId xmlns:a16="http://schemas.microsoft.com/office/drawing/2014/main" id="{A3451629-72D6-4E33-A99A-40FAF7445DD5}"/>
+                </a:ext>
+                <a:ext uri="{C183D7F6-B498-43B3-948B-1728B52AA6E4}">
+                  <adec:decorative xmlns:adec="http://schemas.microsoft.com/office/drawing/2017/decorative" val="1"/>
+                </a:ext>
+              </a:extLst>
+            </p:cNvPr>
+            <p:cNvSpPr/>
+            <p:nvPr>
+              <p:extLst>
+                <p:ext uri="{386F3935-93C4-4BCD-93E2-E3B085C9AB24}">
+                  <p16:designElem xmlns:p16="http://schemas.microsoft.com/office/powerpoint/2015/main" val="1"/>
+                </p:ext>
+              </p:extLst>
+            </p:nvPr>
+          </p:nvSpPr>
+          <p:spPr>
+            <a:xfrm>
+              <a:off x="9181476" y="-8467"/>
+              <a:ext cx="3007349" cy="6866467"/>
+            </a:xfrm>
+            <a:custGeom>
+              <a:avLst/>
+              <a:gdLst/>
+              <a:ahLst/>
+              <a:cxnLst/>
+              <a:rect l="l" t="t" r="r" b="b"/>
+              <a:pathLst>
+                <a:path w="3007349" h="6866467">
+                  <a:moveTo>
+                    <a:pt x="2045532" y="0"/>
+                  </a:moveTo>
+                  <a:lnTo>
+                    <a:pt x="3007349" y="0"/>
+                  </a:lnTo>
+                  <a:lnTo>
+                    <a:pt x="3007349" y="6866467"/>
+                  </a:lnTo>
+                  <a:lnTo>
+                    <a:pt x="0" y="6866467"/>
+                  </a:lnTo>
+                  <a:lnTo>
+                    <a:pt x="2045532" y="0"/>
+                  </a:lnTo>
+                  <a:close/>
+                </a:path>
+              </a:pathLst>
+            </a:custGeom>
+            <a:solidFill>
+              <a:schemeClr val="accent1">
+                <a:alpha val="36000"/>
+              </a:schemeClr>
+            </a:solidFill>
+            <a:ln>
+              <a:noFill/>
+            </a:ln>
+            <a:effectLst/>
+          </p:spPr>
+          <p:style>
+            <a:lnRef idx="1">
+              <a:schemeClr val="accent1"/>
+            </a:lnRef>
+            <a:fillRef idx="3">
+              <a:schemeClr val="accent1"/>
+            </a:fillRef>
+            <a:effectRef idx="2">
+              <a:schemeClr val="accent1"/>
+            </a:effectRef>
+            <a:fontRef idx="minor">
+              <a:schemeClr val="lt1"/>
+            </a:fontRef>
+          </p:style>
+        </p:sp>
+        <p:sp>
+          <p:nvSpPr>
+            <p:cNvPr id="16" name="Rectangle 25">
+              <a:extLst>
+                <a:ext uri="{FF2B5EF4-FFF2-40B4-BE49-F238E27FC236}">
+                  <a16:creationId xmlns:a16="http://schemas.microsoft.com/office/drawing/2014/main" id="{E04F0FD4-BCD5-4435-A6B5-A2E69303B73F}"/>
+                </a:ext>
+                <a:ext uri="{C183D7F6-B498-43B3-948B-1728B52AA6E4}">
+                  <adec:decorative xmlns:adec="http://schemas.microsoft.com/office/drawing/2017/decorative" val="1"/>
+                </a:ext>
+              </a:extLst>
+            </p:cNvPr>
+            <p:cNvSpPr/>
+            <p:nvPr>
+              <p:extLst>
+                <p:ext uri="{386F3935-93C4-4BCD-93E2-E3B085C9AB24}">
+                  <p16:designElem xmlns:p16="http://schemas.microsoft.com/office/powerpoint/2015/main" val="1"/>
+                </p:ext>
+              </p:extLst>
+            </p:nvPr>
+          </p:nvSpPr>
+          <p:spPr>
+            <a:xfrm>
+              <a:off x="9603442" y="-8467"/>
+              <a:ext cx="2588558" cy="6866467"/>
+            </a:xfrm>
+            <a:custGeom>
+              <a:avLst/>
+              <a:gdLst/>
+              <a:ahLst/>
+              <a:cxnLst/>
+              <a:rect l="l" t="t" r="r" b="b"/>
+              <a:pathLst>
+                <a:path w="2573311" h="6866467">
+                  <a:moveTo>
+                    <a:pt x="0" y="0"/>
+                  </a:moveTo>
+                  <a:lnTo>
+                    <a:pt x="2573311" y="0"/>
+                  </a:lnTo>
+                  <a:lnTo>
+                    <a:pt x="2573311" y="6866467"/>
+                  </a:lnTo>
+                  <a:lnTo>
+                    <a:pt x="1202336" y="6866467"/>
+                  </a:lnTo>
+                  <a:lnTo>
+                    <a:pt x="0" y="0"/>
+                  </a:lnTo>
+                  <a:close/>
+                </a:path>
+              </a:pathLst>
+            </a:custGeom>
+            <a:solidFill>
+              <a:schemeClr val="accent1">
+                <a:alpha val="20000"/>
+              </a:schemeClr>
+            </a:solidFill>
+            <a:ln>
+              <a:noFill/>
+            </a:ln>
+            <a:effectLst/>
+          </p:spPr>
+          <p:style>
+            <a:lnRef idx="1">
+              <a:schemeClr val="accent1"/>
+            </a:lnRef>
+            <a:fillRef idx="3">
+              <a:schemeClr val="accent1"/>
+            </a:fillRef>
+            <a:effectRef idx="2">
+              <a:schemeClr val="accent1"/>
+            </a:effectRef>
+            <a:fontRef idx="minor">
+              <a:schemeClr val="lt1"/>
+            </a:fontRef>
+          </p:style>
+        </p:sp>
+        <p:sp>
+          <p:nvSpPr>
+            <p:cNvPr id="17" name="Isosceles Triangle 16">
+              <a:extLst>
+                <a:ext uri="{FF2B5EF4-FFF2-40B4-BE49-F238E27FC236}">
+                  <a16:creationId xmlns:a16="http://schemas.microsoft.com/office/drawing/2014/main" id="{DE110F09-1C81-4E73-B5E9-D857CD879F04}"/>
+                </a:ext>
+                <a:ext uri="{C183D7F6-B498-43B3-948B-1728B52AA6E4}">
+                  <adec:decorative xmlns:adec="http://schemas.microsoft.com/office/drawing/2017/decorative" val="1"/>
+                </a:ext>
+              </a:extLst>
+            </p:cNvPr>
+            <p:cNvSpPr/>
+            <p:nvPr>
+              <p:extLst>
+                <p:ext uri="{386F3935-93C4-4BCD-93E2-E3B085C9AB24}">
+                  <p16:designElem xmlns:p16="http://schemas.microsoft.com/office/powerpoint/2015/main" val="1"/>
+                </p:ext>
+              </p:extLst>
+            </p:nvPr>
+          </p:nvSpPr>
+          <p:spPr>
+            <a:xfrm>
+              <a:off x="8932333" y="3048000"/>
+              <a:ext cx="3259667" cy="3810000"/>
+            </a:xfrm>
+            <a:prstGeom prst="triangle">
+              <a:avLst>
+                <a:gd name="adj" fmla="val 100000"/>
+              </a:avLst>
+            </a:prstGeom>
+            <a:solidFill>
+              <a:schemeClr val="accent1">
+                <a:lumMod val="75000"/>
+                <a:alpha val="66000"/>
+              </a:schemeClr>
+            </a:solidFill>
+            <a:ln>
+              <a:noFill/>
+            </a:ln>
+            <a:effectLst/>
+          </p:spPr>
+          <p:style>
+            <a:lnRef idx="1">
+              <a:schemeClr val="accent1"/>
+            </a:lnRef>
+            <a:fillRef idx="3">
+              <a:schemeClr val="accent1"/>
+            </a:fillRef>
+            <a:effectRef idx="2">
+              <a:schemeClr val="accent1"/>
+            </a:effectRef>
+            <a:fontRef idx="minor">
+              <a:schemeClr val="lt1"/>
+            </a:fontRef>
+          </p:style>
+        </p:sp>
+        <p:sp>
+          <p:nvSpPr>
+            <p:cNvPr id="18" name="Rectangle 27">
+              <a:extLst>
+                <a:ext uri="{FF2B5EF4-FFF2-40B4-BE49-F238E27FC236}">
+                  <a16:creationId xmlns:a16="http://schemas.microsoft.com/office/drawing/2014/main" id="{273A9C01-06BD-4E8E-8BBF-2E2A9ECF49C5}"/>
+                </a:ext>
+                <a:ext uri="{C183D7F6-B498-43B3-948B-1728B52AA6E4}">
+                  <adec:decorative xmlns:adec="http://schemas.microsoft.com/office/drawing/2017/decorative" val="1"/>
+                </a:ext>
+              </a:extLst>
+            </p:cNvPr>
+            <p:cNvSpPr/>
+            <p:nvPr>
+              <p:extLst>
+                <p:ext uri="{386F3935-93C4-4BCD-93E2-E3B085C9AB24}">
+                  <p16:designElem xmlns:p16="http://schemas.microsoft.com/office/powerpoint/2015/main" val="1"/>
+                </p:ext>
+              </p:extLst>
+            </p:nvPr>
+          </p:nvSpPr>
+          <p:spPr>
+            <a:xfrm>
+              <a:off x="9334500" y="-8467"/>
+              <a:ext cx="2854326" cy="6866467"/>
+            </a:xfrm>
+            <a:custGeom>
+              <a:avLst/>
+              <a:gdLst/>
+              <a:ahLst/>
+              <a:cxnLst/>
+              <a:rect l="l" t="t" r="r" b="b"/>
+              <a:pathLst>
+                <a:path w="2858013" h="6866467">
+                  <a:moveTo>
+                    <a:pt x="0" y="0"/>
+                  </a:moveTo>
+                  <a:lnTo>
+                    <a:pt x="2858013" y="0"/>
+                  </a:lnTo>
+                  <a:lnTo>
+                    <a:pt x="2858013" y="6866467"/>
+                  </a:lnTo>
+                  <a:lnTo>
+                    <a:pt x="2473942" y="6866467"/>
+                  </a:lnTo>
+                  <a:lnTo>
+                    <a:pt x="0" y="0"/>
+                  </a:lnTo>
+                  <a:close/>
+                </a:path>
+              </a:pathLst>
+            </a:custGeom>
+            <a:solidFill>
+              <a:schemeClr val="accent1">
+                <a:lumMod val="75000"/>
+                <a:alpha val="50000"/>
+              </a:schemeClr>
+            </a:solidFill>
+            <a:ln>
+              <a:noFill/>
+            </a:ln>
+            <a:effectLst/>
+          </p:spPr>
+          <p:style>
+            <a:lnRef idx="1">
+              <a:schemeClr val="accent1"/>
+            </a:lnRef>
+            <a:fillRef idx="3">
+              <a:schemeClr val="accent1"/>
+            </a:fillRef>
+            <a:effectRef idx="2">
+              <a:schemeClr val="accent1"/>
+            </a:effectRef>
+            <a:fontRef idx="minor">
+              <a:schemeClr val="lt1"/>
+            </a:fontRef>
+          </p:style>
+        </p:sp>
+        <p:sp>
+          <p:nvSpPr>
+            <p:cNvPr id="19" name="Rectangle 28">
+              <a:extLst>
+                <a:ext uri="{FF2B5EF4-FFF2-40B4-BE49-F238E27FC236}">
+                  <a16:creationId xmlns:a16="http://schemas.microsoft.com/office/drawing/2014/main" id="{B206C9B2-27BE-4B6F-A4D0-485FBBEB58FE}"/>
+                </a:ext>
+                <a:ext uri="{C183D7F6-B498-43B3-948B-1728B52AA6E4}">
+                  <adec:decorative xmlns:adec="http://schemas.microsoft.com/office/drawing/2017/decorative" val="1"/>
+                </a:ext>
+              </a:extLst>
+            </p:cNvPr>
+            <p:cNvSpPr/>
+            <p:nvPr>
+              <p:extLst>
+                <p:ext uri="{386F3935-93C4-4BCD-93E2-E3B085C9AB24}">
+                  <p16:designElem xmlns:p16="http://schemas.microsoft.com/office/powerpoint/2015/main" val="1"/>
+                </p:ext>
+              </p:extLst>
+            </p:nvPr>
+          </p:nvSpPr>
+          <p:spPr>
+            <a:xfrm>
+              <a:off x="10898730" y="-8467"/>
+              <a:ext cx="1290094" cy="6866467"/>
+            </a:xfrm>
+            <a:custGeom>
+              <a:avLst/>
+              <a:gdLst/>
+              <a:ahLst/>
+              <a:cxnLst/>
+              <a:rect l="l" t="t" r="r" b="b"/>
+              <a:pathLst>
+                <a:path w="1290094" h="6858000">
+                  <a:moveTo>
+                    <a:pt x="1019735" y="0"/>
+                  </a:moveTo>
+                  <a:lnTo>
+                    <a:pt x="1290094" y="0"/>
+                  </a:lnTo>
+                  <a:lnTo>
+                    <a:pt x="1290094" y="6858000"/>
+                  </a:lnTo>
+                  <a:lnTo>
+                    <a:pt x="0" y="6858000"/>
+                  </a:lnTo>
+                  <a:lnTo>
+                    <a:pt x="1019735" y="0"/>
+                  </a:lnTo>
+                  <a:close/>
+                </a:path>
+              </a:pathLst>
+            </a:custGeom>
+            <a:solidFill>
+              <a:schemeClr val="accent2">
+                <a:alpha val="70000"/>
+              </a:schemeClr>
+            </a:solidFill>
+            <a:ln>
+              <a:noFill/>
+            </a:ln>
+            <a:effectLst/>
+          </p:spPr>
+          <p:style>
+            <a:lnRef idx="1">
+              <a:schemeClr val="accent1"/>
+            </a:lnRef>
+            <a:fillRef idx="3">
+              <a:schemeClr val="accent1"/>
+            </a:fillRef>
+            <a:effectRef idx="2">
+              <a:schemeClr val="accent1"/>
+            </a:effectRef>
+            <a:fontRef idx="minor">
+              <a:schemeClr val="lt1"/>
+            </a:fontRef>
+          </p:style>
+        </p:sp>
+        <p:sp>
+          <p:nvSpPr>
+            <p:cNvPr id="20" name="Rectangle 29">
+              <a:extLst>
+                <a:ext uri="{FF2B5EF4-FFF2-40B4-BE49-F238E27FC236}">
+                  <a16:creationId xmlns:a16="http://schemas.microsoft.com/office/drawing/2014/main" id="{2E7D673E-0C5C-4F2B-B46E-3E9286B9E866}"/>
+                </a:ext>
+                <a:ext uri="{C183D7F6-B498-43B3-948B-1728B52AA6E4}">
+                  <adec:decorative xmlns:adec="http://schemas.microsoft.com/office/drawing/2017/decorative" val="1"/>
+                </a:ext>
+              </a:extLst>
+            </p:cNvPr>
+            <p:cNvSpPr/>
+            <p:nvPr>
+              <p:extLst>
+                <p:ext uri="{386F3935-93C4-4BCD-93E2-E3B085C9AB24}">
+                  <p16:designElem xmlns:p16="http://schemas.microsoft.com/office/powerpoint/2015/main" val="1"/>
+                </p:ext>
+              </p:extLst>
+            </p:nvPr>
+          </p:nvSpPr>
+          <p:spPr>
+            <a:xfrm>
+              <a:off x="10938999" y="-8467"/>
+              <a:ext cx="1249825" cy="6866467"/>
+            </a:xfrm>
+            <a:custGeom>
+              <a:avLst/>
+              <a:gdLst/>
+              <a:ahLst/>
+              <a:cxnLst/>
+              <a:rect l="l" t="t" r="r" b="b"/>
+              <a:pathLst>
+                <a:path w="1249825" h="6858000">
+                  <a:moveTo>
+                    <a:pt x="0" y="0"/>
+                  </a:moveTo>
+                  <a:lnTo>
+                    <a:pt x="1249825" y="0"/>
+                  </a:lnTo>
+                  <a:lnTo>
+                    <a:pt x="1249825" y="6858000"/>
+                  </a:lnTo>
+                  <a:lnTo>
+                    <a:pt x="1109382" y="6858000"/>
+                  </a:lnTo>
+                  <a:lnTo>
+                    <a:pt x="0" y="0"/>
+                  </a:lnTo>
+                  <a:close/>
+                </a:path>
+              </a:pathLst>
+            </a:custGeom>
+            <a:solidFill>
+              <a:schemeClr val="accent2">
+                <a:lumMod val="75000"/>
+                <a:alpha val="80000"/>
+              </a:schemeClr>
+            </a:solidFill>
+            <a:ln>
+              <a:noFill/>
+            </a:ln>
+            <a:effectLst/>
+          </p:spPr>
+          <p:style>
+            <a:lnRef idx="1">
+              <a:schemeClr val="accent1"/>
+            </a:lnRef>
+            <a:fillRef idx="3">
+              <a:schemeClr val="accent1"/>
+            </a:fillRef>
+            <a:effectRef idx="2">
+              <a:schemeClr val="accent1"/>
+            </a:effectRef>
+            <a:fontRef idx="minor">
+              <a:schemeClr val="lt1"/>
+            </a:fontRef>
+          </p:style>
+        </p:sp>
+        <p:sp>
+          <p:nvSpPr>
+            <p:cNvPr id="21" name="Isosceles Triangle 20">
+              <a:extLst>
+                <a:ext uri="{FF2B5EF4-FFF2-40B4-BE49-F238E27FC236}">
+                  <a16:creationId xmlns:a16="http://schemas.microsoft.com/office/drawing/2014/main" id="{F0F78B34-9B26-4CA9-B8F0-B9638730F9F6}"/>
+                </a:ext>
+                <a:ext uri="{C183D7F6-B498-43B3-948B-1728B52AA6E4}">
+                  <adec:decorative xmlns:adec="http://schemas.microsoft.com/office/drawing/2017/decorative" val="1"/>
+                </a:ext>
+              </a:extLst>
+            </p:cNvPr>
+            <p:cNvSpPr/>
+            <p:nvPr>
+              <p:extLst>
+                <p:ext uri="{386F3935-93C4-4BCD-93E2-E3B085C9AB24}">
+                  <p16:designElem xmlns:p16="http://schemas.microsoft.com/office/powerpoint/2015/main" val="1"/>
+                </p:ext>
+              </p:extLst>
+            </p:nvPr>
+          </p:nvSpPr>
+          <p:spPr>
+            <a:xfrm>
+              <a:off x="10371666" y="3589867"/>
+              <a:ext cx="1817159" cy="3268133"/>
+            </a:xfrm>
+            <a:prstGeom prst="triangle">
+              <a:avLst>
+                <a:gd name="adj" fmla="val 100000"/>
+              </a:avLst>
+            </a:prstGeom>
+            <a:solidFill>
+              <a:schemeClr val="accent1">
+                <a:lumMod val="75000"/>
+                <a:alpha val="66000"/>
+              </a:schemeClr>
+            </a:solidFill>
+            <a:ln>
+              <a:noFill/>
+            </a:ln>
+            <a:effectLst/>
+          </p:spPr>
+          <p:style>
+            <a:lnRef idx="1">
+              <a:schemeClr val="accent1"/>
+            </a:lnRef>
+            <a:fillRef idx="3">
+              <a:schemeClr val="accent1"/>
+            </a:fillRef>
+            <a:effectRef idx="2">
+              <a:schemeClr val="accent1"/>
+            </a:effectRef>
+            <a:fontRef idx="minor">
+              <a:schemeClr val="lt1"/>
+            </a:fontRef>
+          </p:style>
+        </p:sp>
+      </p:grpSp>
+      <p:sp>
+        <p:nvSpPr>
+          <p:cNvPr id="2" name="Title 1">
+            <a:extLst>
+              <a:ext uri="{FF2B5EF4-FFF2-40B4-BE49-F238E27FC236}">
+                <a16:creationId xmlns:a16="http://schemas.microsoft.com/office/drawing/2014/main" id="{91277B4E-842C-4921-830C-41ECC60E74F0}"/>
+              </a:ext>
+            </a:extLst>
+          </p:cNvPr>
+          <p:cNvSpPr>
+            <a:spLocks noGrp="1"/>
+          </p:cNvSpPr>
+          <p:nvPr>
+            <p:ph type="title"/>
+          </p:nvPr>
+        </p:nvSpPr>
+        <p:spPr>
+          <a:xfrm>
+            <a:off x="6094856" y="1680201"/>
+            <a:ext cx="3179146" cy="2367559"/>
+          </a:xfrm>
+        </p:spPr>
+        <p:txBody>
+          <a:bodyPr vert="horz" lIns="91440" tIns="45720" rIns="91440" bIns="45720" rtlCol="0" anchor="b">
+            <a:normAutofit/>
+          </a:bodyPr>
+          <a:lstStyle/>
+          <a:p>
+            <a:pPr algn="r"/>
+            <a:r>
+              <a:rPr lang="en-US" sz="5400"/>
+              <a:t>Example 2 UML</a:t>
+            </a:r>
+          </a:p>
+        </p:txBody>
+      </p:sp>
+      <p:pic>
+        <p:nvPicPr>
+          <p:cNvPr id="6" name="Picture Placeholder 5" descr="A screenshot of a cell phone&#10;&#10;Description automatically generated">
+            <a:extLst>
+              <a:ext uri="{FF2B5EF4-FFF2-40B4-BE49-F238E27FC236}">
+                <a16:creationId xmlns:a16="http://schemas.microsoft.com/office/drawing/2014/main" id="{4EF2A7DF-0F43-49E0-9E06-553D7F6B38DE}"/>
+              </a:ext>
+            </a:extLst>
+          </p:cNvPr>
+          <p:cNvPicPr>
+            <a:picLocks noGrp="1" noChangeAspect="1"/>
+          </p:cNvPicPr>
+          <p:nvPr>
+            <p:ph type="pic" idx="1"/>
+          </p:nvPr>
+        </p:nvPicPr>
+        <p:blipFill rotWithShape="1">
+          <a:blip r:embed="rId2"/>
+          <a:srcRect t="3635" r="-2" b="3633"/>
+          <a:stretch/>
+        </p:blipFill>
+        <p:spPr>
+          <a:xfrm>
+            <a:off x="888603" y="1261330"/>
+            <a:ext cx="4973212" cy="4335340"/>
+          </a:xfrm>
+          <a:prstGeom prst="rect">
+            <a:avLst/>
+          </a:prstGeom>
+        </p:spPr>
+      </p:pic>
+    </p:spTree>
+    <p:extLst>
+      <p:ext uri="{BB962C8B-B14F-4D97-AF65-F5344CB8AC3E}">
+        <p14:creationId xmlns:p14="http://schemas.microsoft.com/office/powerpoint/2010/main" val="3231535861"/>
       </p:ext>
     </p:extLst>
   </p:cSld>

</xml_diff>